<commit_message>
made corrections after review
</commit_message>
<xml_diff>
--- a/presentations/diplom/static race detection.pptx
+++ b/presentations/diplom/static race detection.pptx
@@ -5,16 +5,16 @@
     <p:sldMasterId id="2147483648" r:id="rId1"/>
   </p:sldMasterIdLst>
   <p:notesMasterIdLst>
-    <p:notesMasterId r:id="rId22"/>
+    <p:notesMasterId r:id="rId23"/>
   </p:notesMasterIdLst>
   <p:sldIdLst>
     <p:sldId id="256" r:id="rId2"/>
     <p:sldId id="257" r:id="rId3"/>
     <p:sldId id="260" r:id="rId4"/>
     <p:sldId id="273" r:id="rId5"/>
-    <p:sldId id="258" r:id="rId6"/>
-    <p:sldId id="280" r:id="rId7"/>
-    <p:sldId id="259" r:id="rId8"/>
+    <p:sldId id="280" r:id="rId6"/>
+    <p:sldId id="259" r:id="rId7"/>
+    <p:sldId id="258" r:id="rId8"/>
     <p:sldId id="275" r:id="rId9"/>
     <p:sldId id="277" r:id="rId10"/>
     <p:sldId id="276" r:id="rId11"/>
@@ -23,11 +23,12 @@
     <p:sldId id="281" r:id="rId14"/>
     <p:sldId id="279" r:id="rId15"/>
     <p:sldId id="283" r:id="rId16"/>
-    <p:sldId id="262" r:id="rId17"/>
-    <p:sldId id="263" r:id="rId18"/>
-    <p:sldId id="284" r:id="rId19"/>
+    <p:sldId id="286" r:id="rId17"/>
+    <p:sldId id="284" r:id="rId18"/>
+    <p:sldId id="285" r:id="rId19"/>
     <p:sldId id="274" r:id="rId20"/>
-    <p:sldId id="271" r:id="rId21"/>
+    <p:sldId id="287" r:id="rId21"/>
+    <p:sldId id="271" r:id="rId22"/>
   </p:sldIdLst>
   <p:sldSz cx="9144000" cy="6858000" type="screen4x3"/>
   <p:notesSz cx="6858000" cy="9144000"/>
@@ -212,7 +213,7 @@
             <a:fld id="{22010AE4-EAD5-4EEF-A945-6FA18B13F5A9}" type="datetimeFigureOut">
               <a:rPr lang="ru-RU" smtClean="0"/>
               <a:pPr/>
-              <a:t>17.05.2014</a:t>
+              <a:t>18.05.2014</a:t>
             </a:fld>
             <a:endParaRPr lang="ru-RU"/>
           </a:p>
@@ -742,7 +743,7 @@
             <a:fld id="{CEA6B14D-0821-4C2C-82CE-9C65F3F9306A}" type="datetime1">
               <a:rPr lang="ru-RU" smtClean="0"/>
               <a:pPr/>
-              <a:t>17.05.2014</a:t>
+              <a:t>18.05.2014</a:t>
             </a:fld>
             <a:endParaRPr lang="ru-RU"/>
           </a:p>
@@ -909,7 +910,7 @@
             <a:fld id="{CBF73966-6DAD-453D-A6D4-80080695084C}" type="datetime1">
               <a:rPr lang="ru-RU" smtClean="0"/>
               <a:pPr/>
-              <a:t>17.05.2014</a:t>
+              <a:t>18.05.2014</a:t>
             </a:fld>
             <a:endParaRPr lang="ru-RU"/>
           </a:p>
@@ -1086,7 +1087,7 @@
             <a:fld id="{60C2BD43-7D16-471D-94F4-C9721BB6CC51}" type="datetime1">
               <a:rPr lang="ru-RU" smtClean="0"/>
               <a:pPr/>
-              <a:t>17.05.2014</a:t>
+              <a:t>18.05.2014</a:t>
             </a:fld>
             <a:endParaRPr lang="ru-RU"/>
           </a:p>
@@ -1253,7 +1254,7 @@
             <a:fld id="{96A1ED18-55C5-47E1-806F-C13AC0AFFCDF}" type="datetime1">
               <a:rPr lang="ru-RU" smtClean="0"/>
               <a:pPr/>
-              <a:t>17.05.2014</a:t>
+              <a:t>18.05.2014</a:t>
             </a:fld>
             <a:endParaRPr lang="ru-RU"/>
           </a:p>
@@ -1496,7 +1497,7 @@
             <a:fld id="{80CFC8BC-60B2-4B6B-9C0B-678A51AE4FEC}" type="datetime1">
               <a:rPr lang="ru-RU" smtClean="0"/>
               <a:pPr/>
-              <a:t>17.05.2014</a:t>
+              <a:t>18.05.2014</a:t>
             </a:fld>
             <a:endParaRPr lang="ru-RU"/>
           </a:p>
@@ -1781,7 +1782,7 @@
             <a:fld id="{1A23B688-547F-429C-B0D6-4A07BC3EE575}" type="datetime1">
               <a:rPr lang="ru-RU" smtClean="0"/>
               <a:pPr/>
-              <a:t>17.05.2014</a:t>
+              <a:t>18.05.2014</a:t>
             </a:fld>
             <a:endParaRPr lang="ru-RU"/>
           </a:p>
@@ -2200,7 +2201,7 @@
             <a:fld id="{910FAFDB-CCC7-4071-A914-8DA50D8301B3}" type="datetime1">
               <a:rPr lang="ru-RU" smtClean="0"/>
               <a:pPr/>
-              <a:t>17.05.2014</a:t>
+              <a:t>18.05.2014</a:t>
             </a:fld>
             <a:endParaRPr lang="ru-RU"/>
           </a:p>
@@ -2315,7 +2316,7 @@
             <a:fld id="{09D05F4B-8C57-4A06-9BCC-88C4FEC9DF22}" type="datetime1">
               <a:rPr lang="ru-RU" smtClean="0"/>
               <a:pPr/>
-              <a:t>17.05.2014</a:t>
+              <a:t>18.05.2014</a:t>
             </a:fld>
             <a:endParaRPr lang="ru-RU"/>
           </a:p>
@@ -2407,7 +2408,7 @@
             <a:fld id="{878A6FA8-4AF2-436B-B100-EA1CE8823379}" type="datetime1">
               <a:rPr lang="ru-RU" smtClean="0"/>
               <a:pPr/>
-              <a:t>17.05.2014</a:t>
+              <a:t>18.05.2014</a:t>
             </a:fld>
             <a:endParaRPr lang="ru-RU"/>
           </a:p>
@@ -2681,7 +2682,7 @@
             <a:fld id="{749F6870-1B45-47C5-9E9B-0AB301049281}" type="datetime1">
               <a:rPr lang="ru-RU" smtClean="0"/>
               <a:pPr/>
-              <a:t>17.05.2014</a:t>
+              <a:t>18.05.2014</a:t>
             </a:fld>
             <a:endParaRPr lang="ru-RU"/>
           </a:p>
@@ -2931,7 +2932,7 @@
             <a:fld id="{ECD49713-43BE-464A-99A3-7A440665C9A7}" type="datetime1">
               <a:rPr lang="ru-RU" smtClean="0"/>
               <a:pPr/>
-              <a:t>17.05.2014</a:t>
+              <a:t>18.05.2014</a:t>
             </a:fld>
             <a:endParaRPr lang="ru-RU"/>
           </a:p>
@@ -3141,7 +3142,7 @@
             <a:fld id="{66113E02-8A28-4829-8EC3-8D7A05A958CF}" type="datetime1">
               <a:rPr lang="ru-RU" smtClean="0"/>
               <a:pPr/>
-              <a:t>17.05.2014</a:t>
+              <a:t>18.05.2014</a:t>
             </a:fld>
             <a:endParaRPr lang="ru-RU"/>
           </a:p>
@@ -7575,13 +7576,8 @@
             </a:r>
             <a:r>
               <a:rPr lang="ru-RU" dirty="0" smtClean="0"/>
-              <a:t>заменяет формальные параметры функции на значения, переданные в неё (это я еще подумаю </a:t>
-            </a:r>
-            <a:r>
-              <a:rPr lang="ru-RU" smtClean="0"/>
-              <a:t>как описать!)</a:t>
-            </a:r>
-            <a:endParaRPr lang="ru-RU" dirty="0" smtClean="0"/>
+              <a:t>заменяет формальные параметры функции на значения, переданные в неё (это я еще подумаю как описать!)</a:t>
+            </a:r>
           </a:p>
           <a:p>
             <a:r>
@@ -7630,19 +7626,11 @@
             </a:r>
             <a:r>
               <a:rPr lang="en-US" dirty="0" smtClean="0"/>
-              <a:t>) </a:t>
-            </a:r>
-            <a:r>
-              <a:rPr lang="en-US" dirty="0" smtClean="0"/>
-              <a:t>– </a:t>
+              <a:t>) – </a:t>
             </a:r>
             <a:r>
               <a:rPr lang="ru-RU" dirty="0" smtClean="0"/>
-              <a:t>возвращает блок, на который передается выполнение при условном переходе в случае, когда проверяемое условие </a:t>
-            </a:r>
-            <a:r>
-              <a:rPr lang="ru-RU" dirty="0" smtClean="0"/>
-              <a:t>ложно</a:t>
+              <a:t>возвращает блок, на который передается выполнение при условном переходе в случае, когда проверяемое условие ложно</a:t>
             </a:r>
           </a:p>
           <a:p>
@@ -7667,6 +7655,13 @@
   <p:clrMapOvr>
     <a:masterClrMapping/>
   </p:clrMapOvr>
+  <p:timing>
+    <p:tnLst>
+      <p:par>
+        <p:cTn id="1" dur="indefinite" restart="never" nodeType="tmRoot"/>
+      </p:par>
+    </p:tnLst>
+  </p:timing>
 </p:sld>
 </file>
 
@@ -7868,6 +7863,13 @@
   <p:clrMapOvr>
     <a:masterClrMapping/>
   </p:clrMapOvr>
+  <p:timing>
+    <p:tnLst>
+      <p:par>
+        <p:cTn id="1" dur="indefinite" restart="never" nodeType="tmRoot"/>
+      </p:par>
+    </p:tnLst>
+  </p:timing>
 </p:sld>
 </file>
 
@@ -11685,7 +11687,11 @@
           <a:bodyPr/>
           <a:lstStyle/>
           <a:p>
-            <a:endParaRPr lang="ru-RU"/>
+            <a:r>
+              <a:rPr lang="ru-RU" dirty="0" smtClean="0"/>
+              <a:t>Тут будет блок схема алгоритма</a:t>
+            </a:r>
+            <a:endParaRPr lang="ru-RU" dirty="0"/>
           </a:p>
         </p:txBody>
       </p:sp>
@@ -11718,6 +11724,13 @@
   <p:clrMapOvr>
     <a:masterClrMapping/>
   </p:clrMapOvr>
+  <p:timing>
+    <p:tnLst>
+      <p:par>
+        <p:cTn id="1" dur="indefinite" restart="never" nodeType="tmRoot"/>
+      </p:par>
+    </p:tnLst>
+  </p:timing>
 </p:sld>
 </file>
 
@@ -11757,7 +11770,7 @@
           <a:p>
             <a:r>
               <a:rPr lang="ru-RU" dirty="0" smtClean="0"/>
-              <a:t>Анализ относительных множеств блокировок</a:t>
+              <a:t>Формирование таблиц защищённого доступа</a:t>
             </a:r>
             <a:endParaRPr lang="ru-RU" dirty="0"/>
           </a:p>
@@ -11765,1282 +11778,7 @@
       </p:sp>
       <p:sp>
         <p:nvSpPr>
-          <p:cNvPr id="5" name="Прямоугольник 4"/>
-          <p:cNvSpPr/>
-          <p:nvPr/>
-        </p:nvSpPr>
-        <p:spPr>
-          <a:xfrm>
-            <a:off x="3491880" y="2610683"/>
-            <a:ext cx="2880320" cy="4247317"/>
-          </a:xfrm>
-          <a:prstGeom prst="rect">
-            <a:avLst/>
-          </a:prstGeom>
-        </p:spPr>
-        <p:txBody>
-          <a:bodyPr wrap="square">
-            <a:spAutoFit/>
-          </a:bodyPr>
-          <a:lstStyle/>
-          <a:p>
-            <a:r>
-              <a:rPr lang="en-US" dirty="0" err="1" smtClean="0"/>
-              <a:t>airo_read_stats</a:t>
-            </a:r>
-            <a:r>
-              <a:rPr lang="en-US" dirty="0" smtClean="0"/>
-              <a:t>(</a:t>
-            </a:r>
-            <a:r>
-              <a:rPr lang="en-US" dirty="0" err="1" smtClean="0"/>
-              <a:t>ai</a:t>
-            </a:r>
-            <a:r>
-              <a:rPr lang="en-US" dirty="0" smtClean="0"/>
-              <a:t>) {</a:t>
-            </a:r>
-          </a:p>
-          <a:p>
-            <a:r>
-              <a:rPr lang="en-US" dirty="0" smtClean="0"/>
-              <a:t>    if (</a:t>
-            </a:r>
-            <a:r>
-              <a:rPr lang="en-US" dirty="0" err="1" smtClean="0"/>
-              <a:t>ai</a:t>
-            </a:r>
-            <a:r>
-              <a:rPr lang="en-US" dirty="0" smtClean="0"/>
-              <a:t>-&gt;</a:t>
-            </a:r>
-            <a:r>
-              <a:rPr lang="en-US" dirty="0" err="1" smtClean="0"/>
-              <a:t>pwr.ev</a:t>
-            </a:r>
-            <a:r>
-              <a:rPr lang="en-US" dirty="0" smtClean="0"/>
-              <a:t>) {</a:t>
-            </a:r>
-          </a:p>
-          <a:p>
-            <a:r>
-              <a:rPr lang="en-US" dirty="0"/>
-              <a:t> </a:t>
-            </a:r>
-            <a:r>
-              <a:rPr lang="en-US" dirty="0" smtClean="0"/>
-              <a:t>       unlock(&amp;</a:t>
-            </a:r>
-            <a:r>
-              <a:rPr lang="en-US" dirty="0" err="1" smtClean="0"/>
-              <a:t>ai</a:t>
-            </a:r>
-            <a:r>
-              <a:rPr lang="en-US" dirty="0" smtClean="0"/>
-              <a:t>-&gt;lock);</a:t>
-            </a:r>
-          </a:p>
-          <a:p>
-            <a:r>
-              <a:rPr lang="en-US" dirty="0" smtClean="0"/>
-              <a:t>        return;</a:t>
-            </a:r>
-          </a:p>
-          <a:p>
-            <a:r>
-              <a:rPr lang="en-US" dirty="0" smtClean="0"/>
-              <a:t>    }</a:t>
-            </a:r>
-          </a:p>
-          <a:p>
-            <a:r>
-              <a:rPr lang="en-US" dirty="0" smtClean="0"/>
-              <a:t>    unlock(&amp;</a:t>
-            </a:r>
-            <a:r>
-              <a:rPr lang="en-US" dirty="0" err="1" smtClean="0"/>
-              <a:t>ai</a:t>
-            </a:r>
-            <a:r>
-              <a:rPr lang="en-US" dirty="0" smtClean="0"/>
-              <a:t>-&gt;lock);</a:t>
-            </a:r>
-          </a:p>
-          <a:p>
-            <a:r>
-              <a:rPr lang="en-US" dirty="0" smtClean="0"/>
-              <a:t>    </a:t>
-            </a:r>
-            <a:r>
-              <a:rPr lang="en-US" dirty="0" err="1" smtClean="0"/>
-              <a:t>ai</a:t>
-            </a:r>
-            <a:r>
-              <a:rPr lang="en-US" dirty="0" smtClean="0"/>
-              <a:t>-&gt;</a:t>
-            </a:r>
-            <a:r>
-              <a:rPr lang="en-US" dirty="0" err="1" smtClean="0"/>
-              <a:t>stats.rx_p</a:t>
-            </a:r>
-            <a:r>
-              <a:rPr lang="en-US" dirty="0" smtClean="0"/>
-              <a:t> = </a:t>
-            </a:r>
-            <a:r>
-              <a:rPr lang="en-US" dirty="0" err="1" smtClean="0"/>
-              <a:t>vals</a:t>
-            </a:r>
-            <a:r>
-              <a:rPr lang="en-US" dirty="0" smtClean="0"/>
-              <a:t>[43];</a:t>
-            </a:r>
-          </a:p>
-          <a:p>
-            <a:r>
-              <a:rPr lang="en-US" dirty="0" smtClean="0"/>
-              <a:t>}</a:t>
-            </a:r>
-          </a:p>
-          <a:p>
-            <a:endParaRPr lang="en-US" dirty="0"/>
-          </a:p>
-          <a:p>
-            <a:r>
-              <a:rPr lang="en-US" dirty="0" err="1" smtClean="0"/>
-              <a:t>airo_thread</a:t>
-            </a:r>
-            <a:r>
-              <a:rPr lang="en-US" dirty="0" smtClean="0"/>
-              <a:t>(d) {</a:t>
-            </a:r>
-          </a:p>
-          <a:p>
-            <a:r>
-              <a:rPr lang="en-US" dirty="0" smtClean="0"/>
-              <a:t>    dev = d;</a:t>
-            </a:r>
-          </a:p>
-          <a:p>
-            <a:r>
-              <a:rPr lang="en-US" dirty="0" smtClean="0"/>
-              <a:t>    </a:t>
-            </a:r>
-            <a:r>
-              <a:rPr lang="en-US" dirty="0" err="1" smtClean="0"/>
-              <a:t>ai</a:t>
-            </a:r>
-            <a:r>
-              <a:rPr lang="en-US" dirty="0" smtClean="0"/>
-              <a:t> = dev-&gt;</a:t>
-            </a:r>
-            <a:r>
-              <a:rPr lang="en-US" dirty="0" err="1" smtClean="0"/>
-              <a:t>priv</a:t>
-            </a:r>
-            <a:r>
-              <a:rPr lang="en-US" dirty="0" smtClean="0"/>
-              <a:t>;</a:t>
-            </a:r>
-          </a:p>
-          <a:p>
-            <a:r>
-              <a:rPr lang="en-US" dirty="0" smtClean="0"/>
-              <a:t>    lock(&amp;</a:t>
-            </a:r>
-            <a:r>
-              <a:rPr lang="en-US" dirty="0" err="1" smtClean="0"/>
-              <a:t>ai</a:t>
-            </a:r>
-            <a:r>
-              <a:rPr lang="en-US" dirty="0" smtClean="0"/>
-              <a:t>-&gt;lock);</a:t>
-            </a:r>
-          </a:p>
-          <a:p>
-            <a:r>
-              <a:rPr lang="en-US" dirty="0"/>
-              <a:t> </a:t>
-            </a:r>
-            <a:r>
-              <a:rPr lang="en-US" dirty="0" smtClean="0"/>
-              <a:t>   </a:t>
-            </a:r>
-            <a:r>
-              <a:rPr lang="en-US" dirty="0" err="1" smtClean="0"/>
-              <a:t>airo_read_stats</a:t>
-            </a:r>
-            <a:r>
-              <a:rPr lang="en-US" dirty="0" smtClean="0"/>
-              <a:t>(</a:t>
-            </a:r>
-            <a:r>
-              <a:rPr lang="en-US" dirty="0" err="1" smtClean="0"/>
-              <a:t>ai</a:t>
-            </a:r>
-            <a:r>
-              <a:rPr lang="en-US" dirty="0" smtClean="0"/>
-              <a:t>);</a:t>
-            </a:r>
-          </a:p>
-          <a:p>
-            <a:r>
-              <a:rPr lang="en-US" dirty="0" smtClean="0"/>
-              <a:t>}</a:t>
-            </a:r>
-            <a:endParaRPr lang="ru-RU" dirty="0"/>
-          </a:p>
-        </p:txBody>
-      </p:sp>
-      <p:sp>
-        <p:nvSpPr>
-          <p:cNvPr id="6" name="Прямоугольник 5"/>
-          <p:cNvSpPr/>
-          <p:nvPr/>
-        </p:nvSpPr>
-        <p:spPr>
-          <a:xfrm>
-            <a:off x="467544" y="4338875"/>
-            <a:ext cx="2376264" cy="360040"/>
-          </a:xfrm>
-          <a:prstGeom prst="rect">
-            <a:avLst/>
-          </a:prstGeom>
-          <a:solidFill>
-            <a:schemeClr val="bg1"/>
-          </a:solidFill>
-          <a:ln>
-            <a:solidFill>
-              <a:schemeClr val="tx1"/>
-            </a:solidFill>
-          </a:ln>
-        </p:spPr>
-        <p:style>
-          <a:lnRef idx="2">
-            <a:schemeClr val="accent1">
-              <a:shade val="50000"/>
-            </a:schemeClr>
-          </a:lnRef>
-          <a:fillRef idx="1">
-            <a:schemeClr val="accent1"/>
-          </a:fillRef>
-          <a:effectRef idx="0">
-            <a:schemeClr val="accent1"/>
-          </a:effectRef>
-          <a:fontRef idx="minor">
-            <a:schemeClr val="lt1"/>
-          </a:fontRef>
-        </p:style>
-        <p:txBody>
-          <a:bodyPr rtlCol="0" anchor="ctr"/>
-          <a:lstStyle/>
-          <a:p>
-            <a:pPr algn="ctr"/>
-            <a:r>
-              <a:rPr lang="en-US" sz="2000" dirty="0" smtClean="0">
-                <a:solidFill>
-                  <a:schemeClr val="tx1"/>
-                </a:solidFill>
-              </a:rPr>
-              <a:t>L</a:t>
-            </a:r>
-            <a:r>
-              <a:rPr lang="en-US" sz="2000" baseline="-25000" dirty="0" smtClean="0">
-                <a:solidFill>
-                  <a:schemeClr val="tx1"/>
-                </a:solidFill>
-              </a:rPr>
-              <a:t>+</a:t>
-            </a:r>
-            <a:r>
-              <a:rPr lang="en-US" sz="2000" dirty="0" smtClean="0">
-                <a:solidFill>
-                  <a:schemeClr val="tx1"/>
-                </a:solidFill>
-              </a:rPr>
-              <a:t> = {}, L</a:t>
-            </a:r>
-            <a:r>
-              <a:rPr lang="en-US" sz="2000" baseline="-25000" dirty="0" smtClean="0">
-                <a:solidFill>
-                  <a:schemeClr val="tx1"/>
-                </a:solidFill>
-              </a:rPr>
-              <a:t>-</a:t>
-            </a:r>
-            <a:r>
-              <a:rPr lang="en-US" sz="2000" dirty="0" smtClean="0">
-                <a:solidFill>
-                  <a:schemeClr val="tx1"/>
-                </a:solidFill>
-              </a:rPr>
-              <a:t> = {}</a:t>
-            </a:r>
-            <a:endParaRPr lang="ru-RU" sz="2000" dirty="0">
-              <a:solidFill>
-                <a:schemeClr val="tx1"/>
-              </a:solidFill>
-            </a:endParaRPr>
-          </a:p>
-        </p:txBody>
-      </p:sp>
-      <p:cxnSp>
-        <p:nvCxnSpPr>
-          <p:cNvPr id="8" name="Прямая со стрелкой 7"/>
-          <p:cNvCxnSpPr>
-            <a:stCxn id="6" idx="3"/>
-          </p:cNvCxnSpPr>
-          <p:nvPr/>
-        </p:nvCxnSpPr>
-        <p:spPr>
-          <a:xfrm flipV="1">
-            <a:off x="2843808" y="2970723"/>
-            <a:ext cx="936104" cy="1548172"/>
-          </a:xfrm>
-          <a:prstGeom prst="straightConnector1">
-            <a:avLst/>
-          </a:prstGeom>
-          <a:ln>
-            <a:tailEnd type="arrow"/>
-          </a:ln>
-        </p:spPr>
-        <p:style>
-          <a:lnRef idx="1">
-            <a:schemeClr val="accent1"/>
-          </a:lnRef>
-          <a:fillRef idx="0">
-            <a:schemeClr val="accent1"/>
-          </a:fillRef>
-          <a:effectRef idx="0">
-            <a:schemeClr val="accent1"/>
-          </a:effectRef>
-          <a:fontRef idx="minor">
-            <a:schemeClr val="tx1"/>
-          </a:fontRef>
-        </p:style>
-      </p:cxnSp>
-      <p:cxnSp>
-        <p:nvCxnSpPr>
-          <p:cNvPr id="11" name="Прямая со стрелкой 10"/>
-          <p:cNvCxnSpPr>
-            <a:stCxn id="6" idx="3"/>
-          </p:cNvCxnSpPr>
-          <p:nvPr/>
-        </p:nvCxnSpPr>
-        <p:spPr>
-          <a:xfrm>
-            <a:off x="2843808" y="4518895"/>
-            <a:ext cx="936104" cy="900100"/>
-          </a:xfrm>
-          <a:prstGeom prst="straightConnector1">
-            <a:avLst/>
-          </a:prstGeom>
-          <a:ln>
-            <a:tailEnd type="arrow"/>
-          </a:ln>
-        </p:spPr>
-        <p:style>
-          <a:lnRef idx="1">
-            <a:schemeClr val="accent1"/>
-          </a:lnRef>
-          <a:fillRef idx="0">
-            <a:schemeClr val="accent1"/>
-          </a:fillRef>
-          <a:effectRef idx="0">
-            <a:schemeClr val="accent1"/>
-          </a:effectRef>
-          <a:fontRef idx="minor">
-            <a:schemeClr val="tx1"/>
-          </a:fontRef>
-        </p:style>
-      </p:cxnSp>
-      <p:sp>
-        <p:nvSpPr>
-          <p:cNvPr id="14" name="Прямоугольник 13"/>
-          <p:cNvSpPr/>
-          <p:nvPr/>
-        </p:nvSpPr>
-        <p:spPr>
-          <a:xfrm>
-            <a:off x="467544" y="3618795"/>
-            <a:ext cx="2376264" cy="360040"/>
-          </a:xfrm>
-          <a:prstGeom prst="rect">
-            <a:avLst/>
-          </a:prstGeom>
-          <a:solidFill>
-            <a:schemeClr val="bg1"/>
-          </a:solidFill>
-          <a:ln>
-            <a:solidFill>
-              <a:schemeClr val="tx1"/>
-            </a:solidFill>
-          </a:ln>
-        </p:spPr>
-        <p:style>
-          <a:lnRef idx="2">
-            <a:schemeClr val="accent1">
-              <a:shade val="50000"/>
-            </a:schemeClr>
-          </a:lnRef>
-          <a:fillRef idx="1">
-            <a:schemeClr val="accent1"/>
-          </a:fillRef>
-          <a:effectRef idx="0">
-            <a:schemeClr val="accent1"/>
-          </a:effectRef>
-          <a:fontRef idx="minor">
-            <a:schemeClr val="lt1"/>
-          </a:fontRef>
-        </p:style>
-        <p:txBody>
-          <a:bodyPr rtlCol="0" anchor="ctr"/>
-          <a:lstStyle/>
-          <a:p>
-            <a:pPr algn="ctr"/>
-            <a:r>
-              <a:rPr lang="en-US" sz="2000" dirty="0" smtClean="0">
-                <a:solidFill>
-                  <a:schemeClr val="tx1"/>
-                </a:solidFill>
-              </a:rPr>
-              <a:t>L</a:t>
-            </a:r>
-            <a:r>
-              <a:rPr lang="en-US" sz="2000" baseline="-25000" dirty="0" smtClean="0">
-                <a:solidFill>
-                  <a:schemeClr val="tx1"/>
-                </a:solidFill>
-              </a:rPr>
-              <a:t>+</a:t>
-            </a:r>
-            <a:r>
-              <a:rPr lang="en-US" sz="2000" dirty="0" smtClean="0">
-                <a:solidFill>
-                  <a:schemeClr val="tx1"/>
-                </a:solidFill>
-              </a:rPr>
-              <a:t> = {}, L</a:t>
-            </a:r>
-            <a:r>
-              <a:rPr lang="en-US" sz="2000" baseline="-25000" dirty="0" smtClean="0">
-                <a:solidFill>
-                  <a:schemeClr val="tx1"/>
-                </a:solidFill>
-              </a:rPr>
-              <a:t>-</a:t>
-            </a:r>
-            <a:r>
-              <a:rPr lang="en-US" sz="2000" dirty="0" smtClean="0">
-                <a:solidFill>
-                  <a:schemeClr val="tx1"/>
-                </a:solidFill>
-              </a:rPr>
-              <a:t> = {</a:t>
-            </a:r>
-            <a:r>
-              <a:rPr lang="en-US" sz="2000" dirty="0" err="1" smtClean="0">
-                <a:solidFill>
-                  <a:schemeClr val="tx1"/>
-                </a:solidFill>
-              </a:rPr>
-              <a:t>ai</a:t>
-            </a:r>
-            <a:r>
-              <a:rPr lang="en-US" sz="2000" dirty="0" smtClean="0">
-                <a:solidFill>
-                  <a:schemeClr val="tx1"/>
-                </a:solidFill>
-              </a:rPr>
-              <a:t>-&gt;lock}</a:t>
-            </a:r>
-            <a:endParaRPr lang="ru-RU" sz="2000" dirty="0">
-              <a:solidFill>
-                <a:schemeClr val="tx1"/>
-              </a:solidFill>
-            </a:endParaRPr>
-          </a:p>
-        </p:txBody>
-      </p:sp>
-      <p:cxnSp>
-        <p:nvCxnSpPr>
-          <p:cNvPr id="24" name="Прямая со стрелкой 23"/>
-          <p:cNvCxnSpPr>
-            <a:stCxn id="14" idx="3"/>
-          </p:cNvCxnSpPr>
-          <p:nvPr/>
-        </p:nvCxnSpPr>
-        <p:spPr>
-          <a:xfrm flipV="1">
-            <a:off x="2843808" y="3546787"/>
-            <a:ext cx="1152128" cy="252028"/>
-          </a:xfrm>
-          <a:prstGeom prst="straightConnector1">
-            <a:avLst/>
-          </a:prstGeom>
-          <a:ln>
-            <a:tailEnd type="arrow"/>
-          </a:ln>
-        </p:spPr>
-        <p:style>
-          <a:lnRef idx="1">
-            <a:schemeClr val="accent1"/>
-          </a:lnRef>
-          <a:fillRef idx="0">
-            <a:schemeClr val="accent1"/>
-          </a:fillRef>
-          <a:effectRef idx="0">
-            <a:schemeClr val="accent1"/>
-          </a:effectRef>
-          <a:fontRef idx="minor">
-            <a:schemeClr val="tx1"/>
-          </a:fontRef>
-        </p:style>
-      </p:cxnSp>
-      <p:cxnSp>
-        <p:nvCxnSpPr>
-          <p:cNvPr id="26" name="Прямая со стрелкой 25"/>
-          <p:cNvCxnSpPr>
-            <a:stCxn id="14" idx="3"/>
-          </p:cNvCxnSpPr>
-          <p:nvPr/>
-        </p:nvCxnSpPr>
-        <p:spPr>
-          <a:xfrm>
-            <a:off x="2843808" y="3798815"/>
-            <a:ext cx="1008112" cy="468052"/>
-          </a:xfrm>
-          <a:prstGeom prst="straightConnector1">
-            <a:avLst/>
-          </a:prstGeom>
-          <a:ln>
-            <a:tailEnd type="arrow"/>
-          </a:ln>
-        </p:spPr>
-        <p:style>
-          <a:lnRef idx="1">
-            <a:schemeClr val="accent1"/>
-          </a:lnRef>
-          <a:fillRef idx="0">
-            <a:schemeClr val="accent1"/>
-          </a:fillRef>
-          <a:effectRef idx="0">
-            <a:schemeClr val="accent1"/>
-          </a:effectRef>
-          <a:fontRef idx="minor">
-            <a:schemeClr val="tx1"/>
-          </a:fontRef>
-        </p:style>
-      </p:cxnSp>
-      <p:sp>
-        <p:nvSpPr>
-          <p:cNvPr id="27" name="Прямоугольник 26"/>
-          <p:cNvSpPr/>
-          <p:nvPr/>
-        </p:nvSpPr>
-        <p:spPr>
-          <a:xfrm>
-            <a:off x="0" y="4986947"/>
-            <a:ext cx="2808312" cy="360040"/>
-          </a:xfrm>
-          <a:prstGeom prst="rect">
-            <a:avLst/>
-          </a:prstGeom>
-          <a:solidFill>
-            <a:schemeClr val="bg1"/>
-          </a:solidFill>
-          <a:ln>
-            <a:solidFill>
-              <a:schemeClr val="tx1"/>
-            </a:solidFill>
-          </a:ln>
-        </p:spPr>
-        <p:style>
-          <a:lnRef idx="2">
-            <a:schemeClr val="accent1">
-              <a:shade val="50000"/>
-            </a:schemeClr>
-          </a:lnRef>
-          <a:fillRef idx="1">
-            <a:schemeClr val="accent1"/>
-          </a:fillRef>
-          <a:effectRef idx="0">
-            <a:schemeClr val="accent1"/>
-          </a:effectRef>
-          <a:fontRef idx="minor">
-            <a:schemeClr val="lt1"/>
-          </a:fontRef>
-        </p:style>
-        <p:txBody>
-          <a:bodyPr rtlCol="0" anchor="ctr"/>
-          <a:lstStyle/>
-          <a:p>
-            <a:pPr algn="ctr"/>
-            <a:r>
-              <a:rPr lang="en-US" sz="2000" dirty="0" smtClean="0">
-                <a:solidFill>
-                  <a:schemeClr val="tx1"/>
-                </a:solidFill>
-              </a:rPr>
-              <a:t>L</a:t>
-            </a:r>
-            <a:r>
-              <a:rPr lang="en-US" sz="2000" baseline="-25000" dirty="0" smtClean="0">
-                <a:solidFill>
-                  <a:schemeClr val="tx1"/>
-                </a:solidFill>
-              </a:rPr>
-              <a:t>+</a:t>
-            </a:r>
-            <a:r>
-              <a:rPr lang="en-US" sz="2000" dirty="0" smtClean="0">
-                <a:solidFill>
-                  <a:schemeClr val="tx1"/>
-                </a:solidFill>
-              </a:rPr>
-              <a:t> = {d-&gt;</a:t>
-            </a:r>
-            <a:r>
-              <a:rPr lang="en-US" sz="2000" dirty="0" err="1" smtClean="0">
-                <a:solidFill>
-                  <a:schemeClr val="tx1"/>
-                </a:solidFill>
-              </a:rPr>
-              <a:t>priv</a:t>
-            </a:r>
-            <a:r>
-              <a:rPr lang="en-US" sz="2000" dirty="0" smtClean="0">
-                <a:solidFill>
-                  <a:schemeClr val="tx1"/>
-                </a:solidFill>
-              </a:rPr>
-              <a:t>-&gt;lock}, L</a:t>
-            </a:r>
-            <a:r>
-              <a:rPr lang="en-US" sz="2000" baseline="-25000" dirty="0" smtClean="0">
-                <a:solidFill>
-                  <a:schemeClr val="tx1"/>
-                </a:solidFill>
-              </a:rPr>
-              <a:t>-</a:t>
-            </a:r>
-            <a:r>
-              <a:rPr lang="en-US" sz="2000" dirty="0" smtClean="0">
-                <a:solidFill>
-                  <a:schemeClr val="tx1"/>
-                </a:solidFill>
-              </a:rPr>
-              <a:t> = {}</a:t>
-            </a:r>
-            <a:endParaRPr lang="ru-RU" sz="2000" dirty="0">
-              <a:solidFill>
-                <a:schemeClr val="tx1"/>
-              </a:solidFill>
-            </a:endParaRPr>
-          </a:p>
-        </p:txBody>
-      </p:sp>
-      <p:cxnSp>
-        <p:nvCxnSpPr>
-          <p:cNvPr id="29" name="Прямая со стрелкой 28"/>
-          <p:cNvCxnSpPr>
-            <a:stCxn id="27" idx="3"/>
-          </p:cNvCxnSpPr>
-          <p:nvPr/>
-        </p:nvCxnSpPr>
-        <p:spPr>
-          <a:xfrm>
-            <a:off x="2808312" y="5166967"/>
-            <a:ext cx="1043608" cy="1044116"/>
-          </a:xfrm>
-          <a:prstGeom prst="straightConnector1">
-            <a:avLst/>
-          </a:prstGeom>
-          <a:ln>
-            <a:tailEnd type="arrow"/>
-          </a:ln>
-        </p:spPr>
-        <p:style>
-          <a:lnRef idx="1">
-            <a:schemeClr val="accent1"/>
-          </a:lnRef>
-          <a:fillRef idx="0">
-            <a:schemeClr val="accent1"/>
-          </a:fillRef>
-          <a:effectRef idx="0">
-            <a:schemeClr val="accent1"/>
-          </a:effectRef>
-          <a:fontRef idx="minor">
-            <a:schemeClr val="tx1"/>
-          </a:fontRef>
-        </p:style>
-      </p:cxnSp>
-      <p:sp>
-        <p:nvSpPr>
-          <p:cNvPr id="30" name="Прямоугольник 29"/>
-          <p:cNvSpPr/>
-          <p:nvPr/>
-        </p:nvSpPr>
-        <p:spPr>
-          <a:xfrm>
-            <a:off x="0" y="5635019"/>
-            <a:ext cx="2808312" cy="360040"/>
-          </a:xfrm>
-          <a:prstGeom prst="rect">
-            <a:avLst/>
-          </a:prstGeom>
-          <a:solidFill>
-            <a:schemeClr val="bg1"/>
-          </a:solidFill>
-          <a:ln>
-            <a:solidFill>
-              <a:schemeClr val="tx1"/>
-            </a:solidFill>
-          </a:ln>
-        </p:spPr>
-        <p:style>
-          <a:lnRef idx="2">
-            <a:schemeClr val="accent1">
-              <a:shade val="50000"/>
-            </a:schemeClr>
-          </a:lnRef>
-          <a:fillRef idx="1">
-            <a:schemeClr val="accent1"/>
-          </a:fillRef>
-          <a:effectRef idx="0">
-            <a:schemeClr val="accent1"/>
-          </a:effectRef>
-          <a:fontRef idx="minor">
-            <a:schemeClr val="lt1"/>
-          </a:fontRef>
-        </p:style>
-        <p:txBody>
-          <a:bodyPr rtlCol="0" anchor="ctr"/>
-          <a:lstStyle/>
-          <a:p>
-            <a:pPr algn="ctr"/>
-            <a:r>
-              <a:rPr lang="en-US" sz="2000" dirty="0" smtClean="0">
-                <a:solidFill>
-                  <a:schemeClr val="tx1"/>
-                </a:solidFill>
-              </a:rPr>
-              <a:t>L</a:t>
-            </a:r>
-            <a:r>
-              <a:rPr lang="en-US" sz="2000" baseline="-25000" dirty="0" smtClean="0">
-                <a:solidFill>
-                  <a:schemeClr val="tx1"/>
-                </a:solidFill>
-              </a:rPr>
-              <a:t>+</a:t>
-            </a:r>
-            <a:r>
-              <a:rPr lang="en-US" sz="2000" dirty="0" smtClean="0">
-                <a:solidFill>
-                  <a:schemeClr val="tx1"/>
-                </a:solidFill>
-              </a:rPr>
-              <a:t> = {}, L</a:t>
-            </a:r>
-            <a:r>
-              <a:rPr lang="en-US" sz="2000" baseline="-25000" dirty="0" smtClean="0">
-                <a:solidFill>
-                  <a:schemeClr val="tx1"/>
-                </a:solidFill>
-              </a:rPr>
-              <a:t>-</a:t>
-            </a:r>
-            <a:r>
-              <a:rPr lang="en-US" sz="2000" dirty="0" smtClean="0">
-                <a:solidFill>
-                  <a:schemeClr val="tx1"/>
-                </a:solidFill>
-              </a:rPr>
-              <a:t> = {d-&gt;</a:t>
-            </a:r>
-            <a:r>
-              <a:rPr lang="en-US" sz="2000" dirty="0" err="1" smtClean="0">
-                <a:solidFill>
-                  <a:schemeClr val="tx1"/>
-                </a:solidFill>
-              </a:rPr>
-              <a:t>priv</a:t>
-            </a:r>
-            <a:r>
-              <a:rPr lang="en-US" sz="2000" dirty="0" smtClean="0">
-                <a:solidFill>
-                  <a:schemeClr val="tx1"/>
-                </a:solidFill>
-              </a:rPr>
-              <a:t>-&gt;lock}</a:t>
-            </a:r>
-            <a:endParaRPr lang="ru-RU" sz="2000" dirty="0">
-              <a:solidFill>
-                <a:schemeClr val="tx1"/>
-              </a:solidFill>
-            </a:endParaRPr>
-          </a:p>
-        </p:txBody>
-      </p:sp>
-      <p:cxnSp>
-        <p:nvCxnSpPr>
-          <p:cNvPr id="32" name="Прямая со стрелкой 31"/>
-          <p:cNvCxnSpPr>
-            <a:stCxn id="30" idx="3"/>
-          </p:cNvCxnSpPr>
-          <p:nvPr/>
-        </p:nvCxnSpPr>
-        <p:spPr>
-          <a:xfrm>
-            <a:off x="2808312" y="5815039"/>
-            <a:ext cx="1043608" cy="756084"/>
-          </a:xfrm>
-          <a:prstGeom prst="straightConnector1">
-            <a:avLst/>
-          </a:prstGeom>
-          <a:ln>
-            <a:tailEnd type="arrow"/>
-          </a:ln>
-        </p:spPr>
-        <p:style>
-          <a:lnRef idx="1">
-            <a:schemeClr val="accent1"/>
-          </a:lnRef>
-          <a:fillRef idx="0">
-            <a:schemeClr val="accent1"/>
-          </a:fillRef>
-          <a:effectRef idx="0">
-            <a:schemeClr val="accent1"/>
-          </a:effectRef>
-          <a:fontRef idx="minor">
-            <a:schemeClr val="tx1"/>
-          </a:fontRef>
-        </p:style>
-      </p:cxnSp>
-      <p:sp>
-        <p:nvSpPr>
-          <p:cNvPr id="33" name="Правая фигурная скобка 32"/>
-          <p:cNvSpPr/>
-          <p:nvPr/>
-        </p:nvSpPr>
-        <p:spPr>
-          <a:xfrm>
-            <a:off x="5868144" y="2682691"/>
-            <a:ext cx="432048" cy="2088232"/>
-          </a:xfrm>
-          <a:prstGeom prst="rightBrace">
-            <a:avLst/>
-          </a:prstGeom>
-        </p:spPr>
-        <p:style>
-          <a:lnRef idx="1">
-            <a:schemeClr val="accent1"/>
-          </a:lnRef>
-          <a:fillRef idx="0">
-            <a:schemeClr val="accent1"/>
-          </a:fillRef>
-          <a:effectRef idx="0">
-            <a:schemeClr val="accent1"/>
-          </a:effectRef>
-          <a:fontRef idx="minor">
-            <a:schemeClr val="tx1"/>
-          </a:fontRef>
-        </p:style>
-        <p:txBody>
-          <a:bodyPr rtlCol="0" anchor="ctr"/>
-          <a:lstStyle/>
-          <a:p>
-            <a:pPr algn="ctr"/>
-            <a:endParaRPr lang="ru-RU"/>
-          </a:p>
-        </p:txBody>
-      </p:sp>
-      <p:sp>
-        <p:nvSpPr>
-          <p:cNvPr id="34" name="Правая фигурная скобка 33"/>
-          <p:cNvSpPr/>
-          <p:nvPr/>
-        </p:nvSpPr>
-        <p:spPr>
-          <a:xfrm>
-            <a:off x="5868144" y="5130963"/>
-            <a:ext cx="432048" cy="1656184"/>
-          </a:xfrm>
-          <a:prstGeom prst="rightBrace">
-            <a:avLst/>
-          </a:prstGeom>
-        </p:spPr>
-        <p:style>
-          <a:lnRef idx="1">
-            <a:schemeClr val="accent1"/>
-          </a:lnRef>
-          <a:fillRef idx="0">
-            <a:schemeClr val="accent1"/>
-          </a:fillRef>
-          <a:effectRef idx="0">
-            <a:schemeClr val="accent1"/>
-          </a:effectRef>
-          <a:fontRef idx="minor">
-            <a:schemeClr val="tx1"/>
-          </a:fontRef>
-        </p:style>
-        <p:txBody>
-          <a:bodyPr rtlCol="0" anchor="ctr"/>
-          <a:lstStyle/>
-          <a:p>
-            <a:pPr algn="ctr"/>
-            <a:endParaRPr lang="ru-RU"/>
-          </a:p>
-        </p:txBody>
-      </p:sp>
-      <p:sp>
-        <p:nvSpPr>
-          <p:cNvPr id="35" name="Прямоугольник 34"/>
-          <p:cNvSpPr/>
-          <p:nvPr/>
-        </p:nvSpPr>
-        <p:spPr>
-          <a:xfrm>
-            <a:off x="6372200" y="3546787"/>
-            <a:ext cx="2376264" cy="360040"/>
-          </a:xfrm>
-          <a:prstGeom prst="rect">
-            <a:avLst/>
-          </a:prstGeom>
-          <a:solidFill>
-            <a:schemeClr val="bg1"/>
-          </a:solidFill>
-          <a:ln>
-            <a:solidFill>
-              <a:schemeClr val="tx1"/>
-            </a:solidFill>
-          </a:ln>
-        </p:spPr>
-        <p:style>
-          <a:lnRef idx="2">
-            <a:schemeClr val="accent1">
-              <a:shade val="50000"/>
-            </a:schemeClr>
-          </a:lnRef>
-          <a:fillRef idx="1">
-            <a:schemeClr val="accent1"/>
-          </a:fillRef>
-          <a:effectRef idx="0">
-            <a:schemeClr val="accent1"/>
-          </a:effectRef>
-          <a:fontRef idx="minor">
-            <a:schemeClr val="lt1"/>
-          </a:fontRef>
-        </p:style>
-        <p:txBody>
-          <a:bodyPr rtlCol="0" anchor="ctr"/>
-          <a:lstStyle/>
-          <a:p>
-            <a:pPr algn="ctr"/>
-            <a:r>
-              <a:rPr lang="en-US" sz="2000" dirty="0" smtClean="0">
-                <a:solidFill>
-                  <a:schemeClr val="tx1"/>
-                </a:solidFill>
-              </a:rPr>
-              <a:t>L</a:t>
-            </a:r>
-            <a:r>
-              <a:rPr lang="en-US" sz="2000" baseline="-25000" dirty="0" smtClean="0">
-                <a:solidFill>
-                  <a:schemeClr val="tx1"/>
-                </a:solidFill>
-              </a:rPr>
-              <a:t>+</a:t>
-            </a:r>
-            <a:r>
-              <a:rPr lang="en-US" sz="2000" dirty="0" smtClean="0">
-                <a:solidFill>
-                  <a:schemeClr val="tx1"/>
-                </a:solidFill>
-              </a:rPr>
-              <a:t> = {}, L</a:t>
-            </a:r>
-            <a:r>
-              <a:rPr lang="en-US" sz="2000" baseline="-25000" dirty="0" smtClean="0">
-                <a:solidFill>
-                  <a:schemeClr val="tx1"/>
-                </a:solidFill>
-              </a:rPr>
-              <a:t>-</a:t>
-            </a:r>
-            <a:r>
-              <a:rPr lang="en-US" sz="2000" dirty="0" smtClean="0">
-                <a:solidFill>
-                  <a:schemeClr val="tx1"/>
-                </a:solidFill>
-              </a:rPr>
-              <a:t> = {</a:t>
-            </a:r>
-            <a:r>
-              <a:rPr lang="en-US" sz="2000" dirty="0" err="1" smtClean="0">
-                <a:solidFill>
-                  <a:schemeClr val="tx1"/>
-                </a:solidFill>
-              </a:rPr>
-              <a:t>ai</a:t>
-            </a:r>
-            <a:r>
-              <a:rPr lang="en-US" sz="2000" dirty="0" smtClean="0">
-                <a:solidFill>
-                  <a:schemeClr val="tx1"/>
-                </a:solidFill>
-              </a:rPr>
-              <a:t>-&gt;lock}</a:t>
-            </a:r>
-            <a:endParaRPr lang="ru-RU" sz="2000" dirty="0">
-              <a:solidFill>
-                <a:schemeClr val="tx1"/>
-              </a:solidFill>
-            </a:endParaRPr>
-          </a:p>
-        </p:txBody>
-      </p:sp>
-      <p:sp>
-        <p:nvSpPr>
-          <p:cNvPr id="44" name="Прямоугольник 43"/>
-          <p:cNvSpPr/>
-          <p:nvPr/>
-        </p:nvSpPr>
-        <p:spPr>
-          <a:xfrm>
-            <a:off x="6335688" y="5779035"/>
-            <a:ext cx="2808312" cy="360040"/>
-          </a:xfrm>
-          <a:prstGeom prst="rect">
-            <a:avLst/>
-          </a:prstGeom>
-          <a:solidFill>
-            <a:schemeClr val="bg1"/>
-          </a:solidFill>
-          <a:ln>
-            <a:solidFill>
-              <a:schemeClr val="tx1"/>
-            </a:solidFill>
-          </a:ln>
-        </p:spPr>
-        <p:style>
-          <a:lnRef idx="2">
-            <a:schemeClr val="accent1">
-              <a:shade val="50000"/>
-            </a:schemeClr>
-          </a:lnRef>
-          <a:fillRef idx="1">
-            <a:schemeClr val="accent1"/>
-          </a:fillRef>
-          <a:effectRef idx="0">
-            <a:schemeClr val="accent1"/>
-          </a:effectRef>
-          <a:fontRef idx="minor">
-            <a:schemeClr val="lt1"/>
-          </a:fontRef>
-        </p:style>
-        <p:txBody>
-          <a:bodyPr rtlCol="0" anchor="ctr"/>
-          <a:lstStyle/>
-          <a:p>
-            <a:pPr algn="ctr"/>
-            <a:r>
-              <a:rPr lang="en-US" sz="2000" dirty="0" smtClean="0">
-                <a:solidFill>
-                  <a:schemeClr val="tx1"/>
-                </a:solidFill>
-              </a:rPr>
-              <a:t>L</a:t>
-            </a:r>
-            <a:r>
-              <a:rPr lang="en-US" sz="2000" baseline="-25000" dirty="0" smtClean="0">
-                <a:solidFill>
-                  <a:schemeClr val="tx1"/>
-                </a:solidFill>
-              </a:rPr>
-              <a:t>+</a:t>
-            </a:r>
-            <a:r>
-              <a:rPr lang="en-US" sz="2000" dirty="0" smtClean="0">
-                <a:solidFill>
-                  <a:schemeClr val="tx1"/>
-                </a:solidFill>
-              </a:rPr>
-              <a:t> = {}, L</a:t>
-            </a:r>
-            <a:r>
-              <a:rPr lang="en-US" sz="2000" baseline="-25000" dirty="0" smtClean="0">
-                <a:solidFill>
-                  <a:schemeClr val="tx1"/>
-                </a:solidFill>
-              </a:rPr>
-              <a:t>-</a:t>
-            </a:r>
-            <a:r>
-              <a:rPr lang="en-US" sz="2000" dirty="0" smtClean="0">
-                <a:solidFill>
-                  <a:schemeClr val="tx1"/>
-                </a:solidFill>
-              </a:rPr>
-              <a:t> = {d-&gt;</a:t>
-            </a:r>
-            <a:r>
-              <a:rPr lang="en-US" sz="2000" dirty="0" err="1" smtClean="0">
-                <a:solidFill>
-                  <a:schemeClr val="tx1"/>
-                </a:solidFill>
-              </a:rPr>
-              <a:t>priv</a:t>
-            </a:r>
-            <a:r>
-              <a:rPr lang="en-US" sz="2000" dirty="0" smtClean="0">
-                <a:solidFill>
-                  <a:schemeClr val="tx1"/>
-                </a:solidFill>
-              </a:rPr>
-              <a:t>-&gt;lock}</a:t>
-            </a:r>
-            <a:endParaRPr lang="ru-RU" sz="2000" dirty="0">
-              <a:solidFill>
-                <a:schemeClr val="tx1"/>
-              </a:solidFill>
-            </a:endParaRPr>
-          </a:p>
-        </p:txBody>
-      </p:sp>
-      <p:sp>
-        <p:nvSpPr>
-          <p:cNvPr id="20" name="Содержимое 2"/>
-          <p:cNvSpPr>
-            <a:spLocks noGrp="1"/>
-          </p:cNvSpPr>
-          <p:nvPr>
-            <p:ph idx="1"/>
-          </p:nvPr>
-        </p:nvSpPr>
-        <p:spPr>
-          <a:xfrm>
-            <a:off x="683568" y="1484784"/>
-            <a:ext cx="7787208" cy="892695"/>
-          </a:xfrm>
-        </p:spPr>
-        <p:txBody>
-          <a:bodyPr>
-            <a:normAutofit fontScale="55000" lnSpcReduction="20000"/>
-          </a:bodyPr>
-          <a:lstStyle/>
-          <a:p>
-            <a:pPr marL="0" indent="0">
-              <a:buNone/>
-            </a:pPr>
-            <a:r>
-              <a:rPr lang="ru-RU" b="1" i="1" dirty="0" smtClean="0"/>
-              <a:t>Относительное множество блокировок </a:t>
-            </a:r>
-            <a:r>
-              <a:rPr lang="en-US" b="1" i="1" dirty="0" smtClean="0"/>
-              <a:t>L</a:t>
-            </a:r>
-            <a:r>
-              <a:rPr lang="ru-RU" b="1" i="1" dirty="0" smtClean="0"/>
-              <a:t> </a:t>
-            </a:r>
-            <a:r>
-              <a:rPr lang="ru-RU" dirty="0" smtClean="0"/>
-              <a:t>–</a:t>
-            </a:r>
-            <a:r>
-              <a:rPr lang="en-US" dirty="0" smtClean="0"/>
-              <a:t> </a:t>
-            </a:r>
-            <a:r>
-              <a:rPr lang="ru-RU" dirty="0" smtClean="0"/>
-              <a:t>пара (</a:t>
-            </a:r>
-            <a:r>
-              <a:rPr lang="en-US" dirty="0" smtClean="0"/>
-              <a:t>L</a:t>
-            </a:r>
-            <a:r>
-              <a:rPr lang="en-US" baseline="-25000" dirty="0" smtClean="0"/>
-              <a:t>+</a:t>
-            </a:r>
-            <a:r>
-              <a:rPr lang="en-US" dirty="0" smtClean="0"/>
-              <a:t>, L</a:t>
-            </a:r>
-            <a:r>
-              <a:rPr lang="en-US" baseline="-25000" dirty="0" smtClean="0"/>
-              <a:t>-</a:t>
-            </a:r>
-            <a:r>
-              <a:rPr lang="en-US" dirty="0" smtClean="0"/>
-              <a:t>),  </a:t>
-            </a:r>
-            <a:r>
-              <a:rPr lang="ru-RU" dirty="0" smtClean="0"/>
-              <a:t>где</a:t>
-            </a:r>
-            <a:r>
-              <a:rPr lang="en-US" dirty="0" smtClean="0"/>
-              <a:t>:</a:t>
-            </a:r>
-          </a:p>
-          <a:p>
-            <a:pPr marL="0" indent="0"/>
-            <a:r>
-              <a:rPr lang="en-US" dirty="0" smtClean="0"/>
-              <a:t> L</a:t>
-            </a:r>
-            <a:r>
-              <a:rPr lang="en-US" baseline="-25000" dirty="0" smtClean="0"/>
-              <a:t>+</a:t>
-            </a:r>
-            <a:r>
-              <a:rPr lang="en-US" dirty="0" smtClean="0"/>
-              <a:t> - </a:t>
-            </a:r>
-            <a:r>
-              <a:rPr lang="ru-RU" dirty="0" smtClean="0"/>
-              <a:t>множество блокировок, которые захватываются всегда (</a:t>
-            </a:r>
-            <a:r>
-              <a:rPr lang="en-US" dirty="0" smtClean="0"/>
-              <a:t>must-set),</a:t>
-            </a:r>
-          </a:p>
-          <a:p>
-            <a:pPr marL="0" indent="0"/>
-            <a:r>
-              <a:rPr lang="en-US" dirty="0" smtClean="0"/>
-              <a:t> L</a:t>
-            </a:r>
-            <a:r>
-              <a:rPr lang="en-US" baseline="-25000" dirty="0" smtClean="0"/>
-              <a:t>-  </a:t>
-            </a:r>
-            <a:r>
-              <a:rPr lang="en-US" dirty="0" smtClean="0"/>
-              <a:t>- </a:t>
-            </a:r>
-            <a:r>
-              <a:rPr lang="ru-RU" dirty="0" smtClean="0"/>
-              <a:t>множество блокировок, которые могут быть освобождены (</a:t>
-            </a:r>
-            <a:r>
-              <a:rPr lang="en-US" dirty="0" smtClean="0"/>
-              <a:t>may-set).</a:t>
-            </a:r>
-            <a:endParaRPr lang="ru-RU" dirty="0"/>
-          </a:p>
-        </p:txBody>
-      </p:sp>
-      <p:sp>
-        <p:nvSpPr>
-          <p:cNvPr id="19" name="Номер слайда 18"/>
+          <p:cNvPr id="4" name="Номер слайда 3"/>
           <p:cNvSpPr>
             <a:spLocks noGrp="1"/>
           </p:cNvSpPr>
@@ -13059,6 +11797,36 @@
               <a:t>16</a:t>
             </a:fld>
             <a:endParaRPr lang="ru-RU"/>
+          </a:p>
+        </p:txBody>
+      </p:sp>
+      <p:sp>
+        <p:nvSpPr>
+          <p:cNvPr id="11" name="TextBox 10"/>
+          <p:cNvSpPr txBox="1"/>
+          <p:nvPr/>
+        </p:nvSpPr>
+        <p:spPr>
+          <a:xfrm>
+            <a:off x="3059832" y="2708920"/>
+            <a:ext cx="1889684" cy="369332"/>
+          </a:xfrm>
+          <a:prstGeom prst="rect">
+            <a:avLst/>
+          </a:prstGeom>
+          <a:noFill/>
+        </p:spPr>
+        <p:txBody>
+          <a:bodyPr wrap="none" rtlCol="0">
+            <a:spAutoFit/>
+          </a:bodyPr>
+          <a:lstStyle/>
+          <a:p>
+            <a:r>
+              <a:rPr lang="ru-RU" dirty="0" smtClean="0"/>
+              <a:t>Тут будет пример</a:t>
+            </a:r>
+            <a:endParaRPr lang="ru-RU" dirty="0"/>
           </a:p>
         </p:txBody>
       </p:sp>
@@ -13106,893 +11874,6 @@
         </p:nvSpPr>
         <p:spPr/>
         <p:txBody>
-          <a:bodyPr/>
-          <a:lstStyle/>
-          <a:p>
-            <a:r>
-              <a:rPr lang="ru-RU" dirty="0" smtClean="0"/>
-              <a:t>Анализ защищенности доступа</a:t>
-            </a:r>
-            <a:endParaRPr lang="ru-RU" dirty="0"/>
-          </a:p>
-        </p:txBody>
-      </p:sp>
-      <p:graphicFrame>
-        <p:nvGraphicFramePr>
-          <p:cNvPr id="4" name="Таблица 3"/>
-          <p:cNvGraphicFramePr>
-            <a:graphicFrameLocks noGrp="1"/>
-          </p:cNvGraphicFramePr>
-          <p:nvPr/>
-        </p:nvGraphicFramePr>
-        <p:xfrm>
-          <a:off x="1835696" y="2420888"/>
-          <a:ext cx="5112567" cy="1828800"/>
-        </p:xfrm>
-        <a:graphic>
-          <a:graphicData uri="http://schemas.openxmlformats.org/drawingml/2006/table">
-            <a:tbl>
-              <a:tblPr firstRow="1" bandRow="1">
-                <a:tableStyleId>{7E9639D4-E3E2-4D34-9284-5A2195B3D0D7}</a:tableStyleId>
-              </a:tblPr>
-              <a:tblGrid>
-                <a:gridCol w="1704189"/>
-                <a:gridCol w="1704189"/>
-                <a:gridCol w="1704189"/>
-              </a:tblGrid>
-              <a:tr h="652553">
-                <a:tc>
-                  <a:txBody>
-                    <a:bodyPr/>
-                    <a:lstStyle/>
-                    <a:p>
-                      <a:r>
-                        <a:rPr lang="ru-RU" sz="1600" dirty="0" smtClean="0"/>
-                        <a:t>Область</a:t>
-                      </a:r>
-                      <a:r>
-                        <a:rPr lang="ru-RU" sz="1600" baseline="0" dirty="0" smtClean="0"/>
-                        <a:t> памяти</a:t>
-                      </a:r>
-                      <a:endParaRPr lang="ru-RU" sz="1600" dirty="0"/>
-                    </a:p>
-                  </a:txBody>
-                  <a:tcPr/>
-                </a:tc>
-                <a:tc>
-                  <a:txBody>
-                    <a:bodyPr/>
-                    <a:lstStyle/>
-                    <a:p>
-                      <a:r>
-                        <a:rPr lang="ru-RU" sz="1600" dirty="0" smtClean="0"/>
-                        <a:t>Относительное</a:t>
-                      </a:r>
-                      <a:r>
-                        <a:rPr lang="ru-RU" sz="1600" baseline="0" dirty="0" smtClean="0"/>
-                        <a:t> множество блокировок</a:t>
-                      </a:r>
-                      <a:endParaRPr lang="ru-RU" sz="1600" dirty="0"/>
-                    </a:p>
-                  </a:txBody>
-                  <a:tcPr/>
-                </a:tc>
-                <a:tc>
-                  <a:txBody>
-                    <a:bodyPr/>
-                    <a:lstStyle/>
-                    <a:p>
-                      <a:r>
-                        <a:rPr lang="ru-RU" sz="1600" dirty="0" smtClean="0"/>
-                        <a:t>Вид</a:t>
-                      </a:r>
-                      <a:r>
-                        <a:rPr lang="ru-RU" sz="1600" baseline="0" dirty="0" smtClean="0"/>
-                        <a:t> доступа</a:t>
-                      </a:r>
-                      <a:endParaRPr lang="ru-RU" sz="1600" dirty="0"/>
-                    </a:p>
-                  </a:txBody>
-                  <a:tcPr/>
-                </a:tc>
-              </a:tr>
-              <a:tr h="261021">
-                <a:tc>
-                  <a:txBody>
-                    <a:bodyPr/>
-                    <a:lstStyle/>
-                    <a:p>
-                      <a:r>
-                        <a:rPr lang="en-US" sz="1600" dirty="0" err="1" smtClean="0"/>
-                        <a:t>ai</a:t>
-                      </a:r>
-                      <a:r>
-                        <a:rPr lang="en-US" sz="1600" dirty="0" smtClean="0"/>
-                        <a:t>-&gt;</a:t>
-                      </a:r>
-                      <a:r>
-                        <a:rPr lang="en-US" sz="1600" dirty="0" err="1" smtClean="0"/>
-                        <a:t>pwr.ev</a:t>
-                      </a:r>
-                      <a:endParaRPr lang="ru-RU" sz="1600" dirty="0"/>
-                    </a:p>
-                  </a:txBody>
-                  <a:tcPr/>
-                </a:tc>
-                <a:tc>
-                  <a:txBody>
-                    <a:bodyPr/>
-                    <a:lstStyle/>
-                    <a:p>
-                      <a:r>
-                        <a:rPr lang="en-US" sz="1600" dirty="0" smtClean="0"/>
-                        <a:t>{},</a:t>
-                      </a:r>
-                      <a:r>
-                        <a:rPr lang="en-US" sz="1600" baseline="0" dirty="0" smtClean="0"/>
-                        <a:t> {}</a:t>
-                      </a:r>
-                      <a:endParaRPr lang="ru-RU" sz="1600" dirty="0"/>
-                    </a:p>
-                  </a:txBody>
-                  <a:tcPr/>
-                </a:tc>
-                <a:tc>
-                  <a:txBody>
-                    <a:bodyPr/>
-                    <a:lstStyle/>
-                    <a:p>
-                      <a:r>
-                        <a:rPr lang="ru-RU" sz="1600" dirty="0" smtClean="0"/>
-                        <a:t>чтение</a:t>
-                      </a:r>
-                      <a:endParaRPr lang="ru-RU" sz="1600" dirty="0"/>
-                    </a:p>
-                  </a:txBody>
-                  <a:tcPr/>
-                </a:tc>
-              </a:tr>
-              <a:tr h="261021">
-                <a:tc>
-                  <a:txBody>
-                    <a:bodyPr/>
-                    <a:lstStyle/>
-                    <a:p>
-                      <a:r>
-                        <a:rPr lang="en-US" sz="1600" dirty="0" err="1" smtClean="0"/>
-                        <a:t>ai</a:t>
-                      </a:r>
-                      <a:r>
-                        <a:rPr lang="en-US" sz="1600" dirty="0" smtClean="0"/>
-                        <a:t>-&gt;</a:t>
-                      </a:r>
-                      <a:r>
-                        <a:rPr lang="en-US" sz="1600" dirty="0" err="1" smtClean="0"/>
-                        <a:t>stats.rx_p</a:t>
-                      </a:r>
-                      <a:endParaRPr lang="ru-RU" sz="1600" dirty="0"/>
-                    </a:p>
-                  </a:txBody>
-                  <a:tcPr/>
-                </a:tc>
-                <a:tc>
-                  <a:txBody>
-                    <a:bodyPr/>
-                    <a:lstStyle/>
-                    <a:p>
-                      <a:r>
-                        <a:rPr lang="en-US" sz="1600" dirty="0" smtClean="0"/>
-                        <a:t>{}, {</a:t>
-                      </a:r>
-                      <a:r>
-                        <a:rPr lang="en-US" sz="1600" dirty="0" err="1" smtClean="0"/>
-                        <a:t>ai</a:t>
-                      </a:r>
-                      <a:r>
-                        <a:rPr lang="en-US" sz="1600" dirty="0" smtClean="0"/>
-                        <a:t>-&gt;lock}</a:t>
-                      </a:r>
-                      <a:endParaRPr lang="ru-RU" sz="1600" dirty="0"/>
-                    </a:p>
-                  </a:txBody>
-                  <a:tcPr/>
-                </a:tc>
-                <a:tc>
-                  <a:txBody>
-                    <a:bodyPr/>
-                    <a:lstStyle/>
-                    <a:p>
-                      <a:r>
-                        <a:rPr lang="ru-RU" sz="1600" dirty="0" smtClean="0"/>
-                        <a:t>запись</a:t>
-                      </a:r>
-                      <a:endParaRPr lang="ru-RU" sz="1600" dirty="0"/>
-                    </a:p>
-                  </a:txBody>
-                  <a:tcPr/>
-                </a:tc>
-              </a:tr>
-              <a:tr h="261021">
-                <a:tc>
-                  <a:txBody>
-                    <a:bodyPr/>
-                    <a:lstStyle/>
-                    <a:p>
-                      <a:r>
-                        <a:rPr lang="en-US" sz="1600" dirty="0" err="1" smtClean="0"/>
-                        <a:t>vals</a:t>
-                      </a:r>
-                      <a:r>
-                        <a:rPr lang="en-US" sz="1600" dirty="0" smtClean="0"/>
-                        <a:t>[0]</a:t>
-                      </a:r>
-                      <a:endParaRPr lang="ru-RU" sz="1600" dirty="0"/>
-                    </a:p>
-                  </a:txBody>
-                  <a:tcPr/>
-                </a:tc>
-                <a:tc>
-                  <a:txBody>
-                    <a:bodyPr/>
-                    <a:lstStyle/>
-                    <a:p>
-                      <a:pPr marL="0" marR="0" indent="0" algn="l" defTabSz="914400" rtl="0" eaLnBrk="1" fontAlgn="auto" latinLnBrk="0" hangingPunct="1">
-                        <a:lnSpc>
-                          <a:spcPct val="100000"/>
-                        </a:lnSpc>
-                        <a:spcBef>
-                          <a:spcPts val="0"/>
-                        </a:spcBef>
-                        <a:spcAft>
-                          <a:spcPts val="0"/>
-                        </a:spcAft>
-                        <a:buClrTx/>
-                        <a:buSzTx/>
-                        <a:buFontTx/>
-                        <a:buNone/>
-                        <a:tabLst/>
-                        <a:defRPr/>
-                      </a:pPr>
-                      <a:r>
-                        <a:rPr lang="en-US" sz="1600" dirty="0" smtClean="0"/>
-                        <a:t>{}, {</a:t>
-                      </a:r>
-                      <a:r>
-                        <a:rPr lang="en-US" sz="1600" dirty="0" err="1" smtClean="0"/>
-                        <a:t>ai</a:t>
-                      </a:r>
-                      <a:r>
-                        <a:rPr lang="en-US" sz="1600" dirty="0" smtClean="0"/>
-                        <a:t>-&gt;lock}</a:t>
-                      </a:r>
-                      <a:endParaRPr lang="ru-RU" sz="1600" dirty="0"/>
-                    </a:p>
-                  </a:txBody>
-                  <a:tcPr/>
-                </a:tc>
-                <a:tc>
-                  <a:txBody>
-                    <a:bodyPr/>
-                    <a:lstStyle/>
-                    <a:p>
-                      <a:r>
-                        <a:rPr lang="ru-RU" sz="1600" dirty="0" smtClean="0"/>
-                        <a:t>чтение</a:t>
-                      </a:r>
-                      <a:endParaRPr lang="ru-RU" sz="1600" dirty="0"/>
-                    </a:p>
-                  </a:txBody>
-                  <a:tcPr/>
-                </a:tc>
-              </a:tr>
-            </a:tbl>
-          </a:graphicData>
-        </a:graphic>
-      </p:graphicFrame>
-      <p:graphicFrame>
-        <p:nvGraphicFramePr>
-          <p:cNvPr id="5" name="Таблица 4"/>
-          <p:cNvGraphicFramePr>
-            <a:graphicFrameLocks noGrp="1"/>
-          </p:cNvGraphicFramePr>
-          <p:nvPr/>
-        </p:nvGraphicFramePr>
-        <p:xfrm>
-          <a:off x="1835696" y="4365104"/>
-          <a:ext cx="6096000" cy="2306320"/>
-        </p:xfrm>
-        <a:graphic>
-          <a:graphicData uri="http://schemas.openxmlformats.org/drawingml/2006/table">
-            <a:tbl>
-              <a:tblPr firstRow="1" bandRow="1">
-                <a:tableStyleId>{7E9639D4-E3E2-4D34-9284-5A2195B3D0D7}</a:tableStyleId>
-              </a:tblPr>
-              <a:tblGrid>
-                <a:gridCol w="2032000"/>
-                <a:gridCol w="2032000"/>
-                <a:gridCol w="2032000"/>
-              </a:tblGrid>
-              <a:tr h="370840">
-                <a:tc>
-                  <a:txBody>
-                    <a:bodyPr/>
-                    <a:lstStyle/>
-                    <a:p>
-                      <a:pPr marL="0" marR="0" indent="0" algn="l" defTabSz="914400" rtl="0" eaLnBrk="1" fontAlgn="auto" latinLnBrk="0" hangingPunct="1">
-                        <a:lnSpc>
-                          <a:spcPct val="100000"/>
-                        </a:lnSpc>
-                        <a:spcBef>
-                          <a:spcPts val="0"/>
-                        </a:spcBef>
-                        <a:spcAft>
-                          <a:spcPts val="0"/>
-                        </a:spcAft>
-                        <a:buClrTx/>
-                        <a:buSzTx/>
-                        <a:buFontTx/>
-                        <a:buNone/>
-                        <a:tabLst/>
-                        <a:defRPr/>
-                      </a:pPr>
-                      <a:r>
-                        <a:rPr lang="ru-RU" sz="1600" dirty="0" smtClean="0"/>
-                        <a:t>Область</a:t>
-                      </a:r>
-                      <a:r>
-                        <a:rPr lang="ru-RU" sz="1600" baseline="0" dirty="0" smtClean="0"/>
-                        <a:t> памяти</a:t>
-                      </a:r>
-                      <a:endParaRPr lang="ru-RU" sz="1600" dirty="0" smtClean="0"/>
-                    </a:p>
-                  </a:txBody>
-                  <a:tcPr/>
-                </a:tc>
-                <a:tc>
-                  <a:txBody>
-                    <a:bodyPr/>
-                    <a:lstStyle/>
-                    <a:p>
-                      <a:pPr marL="0" marR="0" indent="0" algn="l" defTabSz="914400" rtl="0" eaLnBrk="1" fontAlgn="auto" latinLnBrk="0" hangingPunct="1">
-                        <a:lnSpc>
-                          <a:spcPct val="100000"/>
-                        </a:lnSpc>
-                        <a:spcBef>
-                          <a:spcPts val="0"/>
-                        </a:spcBef>
-                        <a:spcAft>
-                          <a:spcPts val="0"/>
-                        </a:spcAft>
-                        <a:buClrTx/>
-                        <a:buSzTx/>
-                        <a:buFontTx/>
-                        <a:buNone/>
-                        <a:tabLst/>
-                        <a:defRPr/>
-                      </a:pPr>
-                      <a:r>
-                        <a:rPr lang="ru-RU" sz="1600" dirty="0" smtClean="0"/>
-                        <a:t>Относительное</a:t>
-                      </a:r>
-                      <a:r>
-                        <a:rPr lang="ru-RU" sz="1600" baseline="0" dirty="0" smtClean="0"/>
-                        <a:t> множество блокировок</a:t>
-                      </a:r>
-                      <a:endParaRPr lang="ru-RU" sz="1600" dirty="0" smtClean="0"/>
-                    </a:p>
-                  </a:txBody>
-                  <a:tcPr/>
-                </a:tc>
-                <a:tc>
-                  <a:txBody>
-                    <a:bodyPr/>
-                    <a:lstStyle/>
-                    <a:p>
-                      <a:pPr marL="0" marR="0" indent="0" algn="l" defTabSz="914400" rtl="0" eaLnBrk="1" fontAlgn="auto" latinLnBrk="0" hangingPunct="1">
-                        <a:lnSpc>
-                          <a:spcPct val="100000"/>
-                        </a:lnSpc>
-                        <a:spcBef>
-                          <a:spcPts val="0"/>
-                        </a:spcBef>
-                        <a:spcAft>
-                          <a:spcPts val="0"/>
-                        </a:spcAft>
-                        <a:buClrTx/>
-                        <a:buSzTx/>
-                        <a:buFontTx/>
-                        <a:buNone/>
-                        <a:tabLst/>
-                        <a:defRPr/>
-                      </a:pPr>
-                      <a:r>
-                        <a:rPr lang="ru-RU" sz="1600" dirty="0" smtClean="0"/>
-                        <a:t>Вид</a:t>
-                      </a:r>
-                      <a:r>
-                        <a:rPr lang="ru-RU" sz="1600" baseline="0" dirty="0" smtClean="0"/>
-                        <a:t> доступа</a:t>
-                      </a:r>
-                      <a:endParaRPr lang="ru-RU" sz="1600" dirty="0" smtClean="0"/>
-                    </a:p>
-                  </a:txBody>
-                  <a:tcPr/>
-                </a:tc>
-              </a:tr>
-              <a:tr h="370840">
-                <a:tc>
-                  <a:txBody>
-                    <a:bodyPr/>
-                    <a:lstStyle/>
-                    <a:p>
-                      <a:r>
-                        <a:rPr lang="en-US" sz="1600" dirty="0" smtClean="0"/>
-                        <a:t>d-&gt;</a:t>
-                      </a:r>
-                      <a:r>
-                        <a:rPr lang="en-US" sz="1600" dirty="0" err="1" smtClean="0"/>
-                        <a:t>priv</a:t>
-                      </a:r>
-                      <a:endParaRPr lang="ru-RU" sz="1600" dirty="0"/>
-                    </a:p>
-                  </a:txBody>
-                  <a:tcPr/>
-                </a:tc>
-                <a:tc>
-                  <a:txBody>
-                    <a:bodyPr/>
-                    <a:lstStyle/>
-                    <a:p>
-                      <a:r>
-                        <a:rPr lang="en-US" sz="1600" dirty="0" smtClean="0"/>
-                        <a:t>{}, {}</a:t>
-                      </a:r>
-                      <a:endParaRPr lang="ru-RU" sz="1600" dirty="0"/>
-                    </a:p>
-                  </a:txBody>
-                  <a:tcPr/>
-                </a:tc>
-                <a:tc>
-                  <a:txBody>
-                    <a:bodyPr/>
-                    <a:lstStyle/>
-                    <a:p>
-                      <a:r>
-                        <a:rPr lang="ru-RU" sz="1600" dirty="0" smtClean="0"/>
-                        <a:t>чтение</a:t>
-                      </a:r>
-                      <a:endParaRPr lang="ru-RU" sz="1600" dirty="0"/>
-                    </a:p>
-                  </a:txBody>
-                  <a:tcPr/>
-                </a:tc>
-              </a:tr>
-              <a:tr h="370840">
-                <a:tc>
-                  <a:txBody>
-                    <a:bodyPr/>
-                    <a:lstStyle/>
-                    <a:p>
-                      <a:r>
-                        <a:rPr lang="en-US" sz="1600" dirty="0" smtClean="0"/>
-                        <a:t>d-&gt;</a:t>
-                      </a:r>
-                      <a:r>
-                        <a:rPr lang="en-US" sz="1600" dirty="0" err="1" smtClean="0"/>
-                        <a:t>priv</a:t>
-                      </a:r>
-                      <a:r>
-                        <a:rPr lang="en-US" sz="1600" dirty="0" smtClean="0"/>
-                        <a:t>-&gt;</a:t>
-                      </a:r>
-                      <a:r>
-                        <a:rPr lang="en-US" sz="1600" dirty="0" err="1" smtClean="0"/>
-                        <a:t>pwr.ev</a:t>
-                      </a:r>
-                      <a:endParaRPr lang="ru-RU" sz="1600" dirty="0"/>
-                    </a:p>
-                  </a:txBody>
-                  <a:tcPr/>
-                </a:tc>
-                <a:tc>
-                  <a:txBody>
-                    <a:bodyPr/>
-                    <a:lstStyle/>
-                    <a:p>
-                      <a:r>
-                        <a:rPr lang="en-US" sz="1600" dirty="0" smtClean="0"/>
-                        <a:t>{d-&gt;</a:t>
-                      </a:r>
-                      <a:r>
-                        <a:rPr lang="en-US" sz="1600" dirty="0" err="1" smtClean="0"/>
-                        <a:t>priv</a:t>
-                      </a:r>
-                      <a:r>
-                        <a:rPr lang="en-US" sz="1600" dirty="0" smtClean="0"/>
-                        <a:t>-&gt;lock},</a:t>
-                      </a:r>
-                      <a:r>
-                        <a:rPr lang="en-US" sz="1600" baseline="0" dirty="0" smtClean="0"/>
-                        <a:t> {}</a:t>
-                      </a:r>
-                      <a:endParaRPr lang="ru-RU" sz="1600" dirty="0"/>
-                    </a:p>
-                  </a:txBody>
-                  <a:tcPr/>
-                </a:tc>
-                <a:tc>
-                  <a:txBody>
-                    <a:bodyPr/>
-                    <a:lstStyle/>
-                    <a:p>
-                      <a:r>
-                        <a:rPr lang="ru-RU" sz="1600" dirty="0" smtClean="0"/>
-                        <a:t>чтение</a:t>
-                      </a:r>
-                      <a:endParaRPr lang="ru-RU" sz="1600" dirty="0"/>
-                    </a:p>
-                  </a:txBody>
-                  <a:tcPr/>
-                </a:tc>
-              </a:tr>
-              <a:tr h="370840">
-                <a:tc>
-                  <a:txBody>
-                    <a:bodyPr/>
-                    <a:lstStyle/>
-                    <a:p>
-                      <a:r>
-                        <a:rPr lang="en-US" sz="1600" dirty="0" smtClean="0"/>
-                        <a:t>d-&gt;</a:t>
-                      </a:r>
-                      <a:r>
-                        <a:rPr lang="en-US" sz="1600" dirty="0" err="1" smtClean="0"/>
-                        <a:t>priv</a:t>
-                      </a:r>
-                      <a:r>
-                        <a:rPr lang="en-US" sz="1600" dirty="0" smtClean="0"/>
-                        <a:t>-&gt;</a:t>
-                      </a:r>
-                      <a:r>
-                        <a:rPr lang="en-US" sz="1600" dirty="0" err="1" smtClean="0"/>
-                        <a:t>stats.rx_p</a:t>
-                      </a:r>
-                      <a:endParaRPr lang="ru-RU" sz="1600" dirty="0"/>
-                    </a:p>
-                  </a:txBody>
-                  <a:tcPr/>
-                </a:tc>
-                <a:tc>
-                  <a:txBody>
-                    <a:bodyPr/>
-                    <a:lstStyle/>
-                    <a:p>
-                      <a:r>
-                        <a:rPr lang="en-US" sz="1600" dirty="0" smtClean="0"/>
-                        <a:t>{}, {d-&gt;</a:t>
-                      </a:r>
-                      <a:r>
-                        <a:rPr lang="en-US" sz="1600" dirty="0" err="1" smtClean="0"/>
-                        <a:t>priv</a:t>
-                      </a:r>
-                      <a:r>
-                        <a:rPr lang="en-US" sz="1600" dirty="0" smtClean="0"/>
-                        <a:t>-&gt;lock}</a:t>
-                      </a:r>
-                      <a:endParaRPr lang="ru-RU" sz="1600" dirty="0"/>
-                    </a:p>
-                  </a:txBody>
-                  <a:tcPr/>
-                </a:tc>
-                <a:tc>
-                  <a:txBody>
-                    <a:bodyPr/>
-                    <a:lstStyle/>
-                    <a:p>
-                      <a:r>
-                        <a:rPr lang="ru-RU" sz="1600" dirty="0" smtClean="0"/>
-                        <a:t>запись</a:t>
-                      </a:r>
-                      <a:endParaRPr lang="ru-RU" sz="1600" dirty="0"/>
-                    </a:p>
-                  </a:txBody>
-                  <a:tcPr/>
-                </a:tc>
-              </a:tr>
-              <a:tr h="370840">
-                <a:tc>
-                  <a:txBody>
-                    <a:bodyPr/>
-                    <a:lstStyle/>
-                    <a:p>
-                      <a:r>
-                        <a:rPr lang="en-US" sz="1600" dirty="0" err="1" smtClean="0"/>
-                        <a:t>vals</a:t>
-                      </a:r>
-                      <a:r>
-                        <a:rPr lang="en-US" sz="1600" dirty="0" smtClean="0"/>
-                        <a:t>[0]</a:t>
-                      </a:r>
-                      <a:endParaRPr lang="ru-RU" sz="1600" dirty="0"/>
-                    </a:p>
-                  </a:txBody>
-                  <a:tcPr/>
-                </a:tc>
-                <a:tc>
-                  <a:txBody>
-                    <a:bodyPr/>
-                    <a:lstStyle/>
-                    <a:p>
-                      <a:r>
-                        <a:rPr lang="en-US" sz="1600" dirty="0" smtClean="0"/>
-                        <a:t>{},</a:t>
-                      </a:r>
-                      <a:r>
-                        <a:rPr lang="en-US" sz="1600" baseline="0" dirty="0" smtClean="0"/>
-                        <a:t> {d-&gt;</a:t>
-                      </a:r>
-                      <a:r>
-                        <a:rPr lang="en-US" sz="1600" baseline="0" dirty="0" err="1" smtClean="0"/>
-                        <a:t>priv</a:t>
-                      </a:r>
-                      <a:r>
-                        <a:rPr lang="en-US" sz="1600" baseline="0" dirty="0" smtClean="0"/>
-                        <a:t>-&gt;lock}</a:t>
-                      </a:r>
-                      <a:endParaRPr lang="ru-RU" sz="1600" dirty="0"/>
-                    </a:p>
-                  </a:txBody>
-                  <a:tcPr/>
-                </a:tc>
-                <a:tc>
-                  <a:txBody>
-                    <a:bodyPr/>
-                    <a:lstStyle/>
-                    <a:p>
-                      <a:r>
-                        <a:rPr lang="ru-RU" sz="1600" dirty="0" smtClean="0"/>
-                        <a:t>чтение</a:t>
-                      </a:r>
-                      <a:endParaRPr lang="ru-RU" sz="1600" dirty="0"/>
-                    </a:p>
-                  </a:txBody>
-                  <a:tcPr/>
-                </a:tc>
-              </a:tr>
-            </a:tbl>
-          </a:graphicData>
-        </a:graphic>
-      </p:graphicFrame>
-      <p:sp>
-        <p:nvSpPr>
-          <p:cNvPr id="6" name="Прямоугольник 5"/>
-          <p:cNvSpPr/>
-          <p:nvPr/>
-        </p:nvSpPr>
-        <p:spPr>
-          <a:xfrm>
-            <a:off x="0" y="2564904"/>
-            <a:ext cx="1695721" cy="369332"/>
-          </a:xfrm>
-          <a:prstGeom prst="rect">
-            <a:avLst/>
-          </a:prstGeom>
-        </p:spPr>
-        <p:txBody>
-          <a:bodyPr wrap="none">
-            <a:spAutoFit/>
-          </a:bodyPr>
-          <a:lstStyle/>
-          <a:p>
-            <a:r>
-              <a:rPr lang="en-US" b="1" i="1" u="sng" dirty="0" err="1" smtClean="0"/>
-              <a:t>airo_read_stats</a:t>
-            </a:r>
-            <a:endParaRPr lang="ru-RU" b="1" i="1" u="sng" dirty="0"/>
-          </a:p>
-        </p:txBody>
-      </p:sp>
-      <p:sp>
-        <p:nvSpPr>
-          <p:cNvPr id="7" name="Прямоугольник 6"/>
-          <p:cNvSpPr/>
-          <p:nvPr/>
-        </p:nvSpPr>
-        <p:spPr>
-          <a:xfrm>
-            <a:off x="0" y="4509120"/>
-            <a:ext cx="1322798" cy="369332"/>
-          </a:xfrm>
-          <a:prstGeom prst="rect">
-            <a:avLst/>
-          </a:prstGeom>
-        </p:spPr>
-        <p:txBody>
-          <a:bodyPr wrap="none">
-            <a:spAutoFit/>
-          </a:bodyPr>
-          <a:lstStyle/>
-          <a:p>
-            <a:r>
-              <a:rPr lang="en-US" b="1" i="1" u="sng" dirty="0" err="1" smtClean="0"/>
-              <a:t>airo_thread</a:t>
-            </a:r>
-            <a:endParaRPr lang="ru-RU" b="1" i="1" u="sng" dirty="0"/>
-          </a:p>
-        </p:txBody>
-      </p:sp>
-      <p:sp>
-        <p:nvSpPr>
-          <p:cNvPr id="9" name="Содержимое 2"/>
-          <p:cNvSpPr>
-            <a:spLocks noGrp="1"/>
-          </p:cNvSpPr>
-          <p:nvPr>
-            <p:ph idx="1"/>
-          </p:nvPr>
-        </p:nvSpPr>
-        <p:spPr>
-          <a:xfrm>
-            <a:off x="1799184" y="1124744"/>
-            <a:ext cx="5437112" cy="1152128"/>
-          </a:xfrm>
-        </p:spPr>
-        <p:txBody>
-          <a:bodyPr>
-            <a:normAutofit fontScale="55000" lnSpcReduction="20000"/>
-          </a:bodyPr>
-          <a:lstStyle/>
-          <a:p>
-            <a:pPr>
-              <a:buNone/>
-            </a:pPr>
-            <a:r>
-              <a:rPr lang="ru-RU" dirty="0" smtClean="0"/>
-              <a:t>Защищенный доступ – тройка (</a:t>
-            </a:r>
-            <a:r>
-              <a:rPr lang="en-US" i="1" dirty="0" smtClean="0"/>
-              <a:t>o, L, k</a:t>
-            </a:r>
-            <a:r>
-              <a:rPr lang="en-US" dirty="0" smtClean="0"/>
-              <a:t>), </a:t>
-            </a:r>
-            <a:r>
-              <a:rPr lang="ru-RU" dirty="0" smtClean="0"/>
-              <a:t>где</a:t>
-            </a:r>
-            <a:r>
-              <a:rPr lang="en-US" dirty="0" smtClean="0"/>
-              <a:t>:</a:t>
-            </a:r>
-            <a:endParaRPr lang="ru-RU" dirty="0" smtClean="0"/>
-          </a:p>
-          <a:p>
-            <a:pPr marL="0" indent="0"/>
-            <a:r>
-              <a:rPr lang="en-US" i="1" dirty="0" smtClean="0"/>
-              <a:t>o</a:t>
-            </a:r>
-            <a:r>
-              <a:rPr lang="en-US" dirty="0" smtClean="0"/>
-              <a:t> – </a:t>
-            </a:r>
-            <a:r>
-              <a:rPr lang="ru-RU" dirty="0" smtClean="0"/>
-              <a:t>область памяти</a:t>
-            </a:r>
-            <a:r>
-              <a:rPr lang="en-US" dirty="0" smtClean="0"/>
-              <a:t>, </a:t>
-            </a:r>
-            <a:r>
-              <a:rPr lang="ru-RU" dirty="0" smtClean="0"/>
-              <a:t>к которой производится доступ,</a:t>
-            </a:r>
-          </a:p>
-          <a:p>
-            <a:pPr marL="0" indent="0"/>
-            <a:r>
-              <a:rPr lang="en-US" i="1" dirty="0" smtClean="0"/>
-              <a:t>L</a:t>
-            </a:r>
-            <a:r>
-              <a:rPr lang="en-US" dirty="0" smtClean="0"/>
-              <a:t> - </a:t>
-            </a:r>
-            <a:r>
-              <a:rPr lang="ru-RU" dirty="0" smtClean="0"/>
-              <a:t>относительное множество блокировок,</a:t>
-            </a:r>
-          </a:p>
-          <a:p>
-            <a:pPr marL="0" indent="0"/>
-            <a:r>
-              <a:rPr lang="en-US" i="1" dirty="0" smtClean="0"/>
-              <a:t>k</a:t>
-            </a:r>
-            <a:r>
-              <a:rPr lang="en-US" dirty="0" smtClean="0"/>
-              <a:t> – </a:t>
-            </a:r>
-            <a:r>
-              <a:rPr lang="ru-RU" dirty="0" smtClean="0"/>
-              <a:t>вид доступа (чтение</a:t>
-            </a:r>
-            <a:r>
-              <a:rPr lang="en-US" dirty="0" smtClean="0"/>
-              <a:t>/</a:t>
-            </a:r>
-            <a:r>
-              <a:rPr lang="ru-RU" dirty="0" smtClean="0"/>
-              <a:t>запись).</a:t>
-            </a:r>
-            <a:endParaRPr lang="ru-RU" dirty="0"/>
-          </a:p>
-        </p:txBody>
-      </p:sp>
-      <p:sp>
-        <p:nvSpPr>
-          <p:cNvPr id="8" name="Номер слайда 7"/>
-          <p:cNvSpPr>
-            <a:spLocks noGrp="1"/>
-          </p:cNvSpPr>
-          <p:nvPr>
-            <p:ph type="sldNum" sz="quarter" idx="12"/>
-          </p:nvPr>
-        </p:nvSpPr>
-        <p:spPr/>
-        <p:txBody>
-          <a:bodyPr/>
-          <a:lstStyle/>
-          <a:p>
-            <a:fld id="{6ACCCD26-A6AD-4D04-8A48-0C02F87992A0}" type="slidenum">
-              <a:rPr lang="ru-RU" smtClean="0"/>
-              <a:pPr/>
-              <a:t>17</a:t>
-            </a:fld>
-            <a:endParaRPr lang="ru-RU"/>
-          </a:p>
-        </p:txBody>
-      </p:sp>
-    </p:spTree>
-  </p:cSld>
-  <p:clrMapOvr>
-    <a:masterClrMapping/>
-  </p:clrMapOvr>
-</p:sld>
-</file>
-
-<file path=ppt/slides/slide18.xml><?xml version="1.0" encoding="utf-8"?>
-<p:sld xmlns:a="http://schemas.openxmlformats.org/drawingml/2006/main" xmlns:r="http://schemas.openxmlformats.org/officeDocument/2006/relationships" xmlns:p="http://schemas.openxmlformats.org/presentationml/2006/main">
-  <p:cSld>
-    <p:spTree>
-      <p:nvGrpSpPr>
-        <p:cNvPr id="1" name=""/>
-        <p:cNvGrpSpPr/>
-        <p:nvPr/>
-      </p:nvGrpSpPr>
-      <p:grpSpPr>
-        <a:xfrm>
-          <a:off x="0" y="0"/>
-          <a:ext cx="0" cy="0"/>
-          <a:chOff x="0" y="0"/>
-          <a:chExt cx="0" cy="0"/>
-        </a:xfrm>
-      </p:grpSpPr>
-      <p:sp>
-        <p:nvSpPr>
-          <p:cNvPr id="2" name="Заголовок 1"/>
-          <p:cNvSpPr>
-            <a:spLocks noGrp="1"/>
-          </p:cNvSpPr>
-          <p:nvPr>
-            <p:ph type="title"/>
-          </p:nvPr>
-        </p:nvSpPr>
-        <p:spPr/>
-        <p:txBody>
           <a:bodyPr>
             <a:normAutofit fontScale="90000"/>
           </a:bodyPr>
@@ -14047,7 +11928,7 @@
             <a:fld id="{6ACCCD26-A6AD-4D04-8A48-0C02F87992A0}" type="slidenum">
               <a:rPr lang="ru-RU" smtClean="0"/>
               <a:pPr/>
-              <a:t>18</a:t>
+              <a:t>17</a:t>
             </a:fld>
             <a:endParaRPr lang="ru-RU"/>
           </a:p>
@@ -14058,6 +11939,117 @@
   <p:clrMapOvr>
     <a:masterClrMapping/>
   </p:clrMapOvr>
+  <p:timing>
+    <p:tnLst>
+      <p:par>
+        <p:cTn id="1" dur="indefinite" restart="never" nodeType="tmRoot"/>
+      </p:par>
+    </p:tnLst>
+  </p:timing>
+</p:sld>
+</file>
+
+<file path=ppt/slides/slide18.xml><?xml version="1.0" encoding="utf-8"?>
+<p:sld xmlns:a="http://schemas.openxmlformats.org/drawingml/2006/main" xmlns:r="http://schemas.openxmlformats.org/officeDocument/2006/relationships" xmlns:p="http://schemas.openxmlformats.org/presentationml/2006/main">
+  <p:cSld>
+    <p:spTree>
+      <p:nvGrpSpPr>
+        <p:cNvPr id="1" name=""/>
+        <p:cNvGrpSpPr/>
+        <p:nvPr/>
+      </p:nvGrpSpPr>
+      <p:grpSpPr>
+        <a:xfrm>
+          <a:off x="0" y="0"/>
+          <a:ext cx="0" cy="0"/>
+          <a:chOff x="0" y="0"/>
+          <a:chExt cx="0" cy="0"/>
+        </a:xfrm>
+      </p:grpSpPr>
+      <p:sp>
+        <p:nvSpPr>
+          <p:cNvPr id="2" name="Заголовок 1"/>
+          <p:cNvSpPr>
+            <a:spLocks noGrp="1"/>
+          </p:cNvSpPr>
+          <p:nvPr>
+            <p:ph type="title"/>
+          </p:nvPr>
+        </p:nvSpPr>
+        <p:spPr/>
+        <p:txBody>
+          <a:bodyPr>
+            <a:normAutofit fontScale="90000"/>
+          </a:bodyPr>
+          <a:lstStyle/>
+          <a:p>
+            <a:r>
+              <a:rPr lang="ru-RU" dirty="0" smtClean="0"/>
+              <a:t>Определение мест возможного возникновения гонок</a:t>
+            </a:r>
+            <a:endParaRPr lang="ru-RU" dirty="0"/>
+          </a:p>
+        </p:txBody>
+      </p:sp>
+      <p:sp>
+        <p:nvSpPr>
+          <p:cNvPr id="3" name="Содержимое 2"/>
+          <p:cNvSpPr>
+            <a:spLocks noGrp="1"/>
+          </p:cNvSpPr>
+          <p:nvPr>
+            <p:ph idx="1"/>
+          </p:nvPr>
+        </p:nvSpPr>
+        <p:spPr/>
+        <p:txBody>
+          <a:bodyPr/>
+          <a:lstStyle/>
+          <a:p>
+            <a:r>
+              <a:rPr lang="ru-RU" dirty="0" smtClean="0"/>
+              <a:t>Тут будет пример</a:t>
+            </a:r>
+            <a:endParaRPr lang="ru-RU" dirty="0"/>
+          </a:p>
+        </p:txBody>
+      </p:sp>
+      <p:sp>
+        <p:nvSpPr>
+          <p:cNvPr id="4" name="Номер слайда 3"/>
+          <p:cNvSpPr>
+            <a:spLocks noGrp="1"/>
+          </p:cNvSpPr>
+          <p:nvPr>
+            <p:ph type="sldNum" sz="quarter" idx="12"/>
+          </p:nvPr>
+        </p:nvSpPr>
+        <p:spPr/>
+        <p:txBody>
+          <a:bodyPr/>
+          <a:lstStyle/>
+          <a:p>
+            <a:fld id="{6ACCCD26-A6AD-4D04-8A48-0C02F87992A0}" type="slidenum">
+              <a:rPr lang="ru-RU" smtClean="0"/>
+              <a:pPr/>
+              <a:t>18</a:t>
+            </a:fld>
+            <a:endParaRPr lang="ru-RU"/>
+          </a:p>
+        </p:txBody>
+      </p:sp>
+    </p:spTree>
+  </p:cSld>
+  <p:clrMapOvr>
+    <a:masterClrMapping/>
+  </p:clrMapOvr>
+  <p:timing>
+    <p:tnLst>
+      <p:par>
+        <p:cTn id="1" dur="indefinite" restart="never" nodeType="tmRoot"/>
+      </p:par>
+    </p:tnLst>
+  </p:timing>
 </p:sld>
 </file>
 
@@ -14116,7 +12108,11 @@
           <a:bodyPr/>
           <a:lstStyle/>
           <a:p>
-            <a:endParaRPr lang="ru-RU"/>
+            <a:r>
+              <a:rPr lang="ru-RU" dirty="0" smtClean="0"/>
+              <a:t>Тут будет схема ПО</a:t>
+            </a:r>
+            <a:endParaRPr lang="ru-RU" dirty="0"/>
           </a:p>
         </p:txBody>
       </p:sp>
@@ -14149,6 +12145,13 @@
   <p:clrMapOvr>
     <a:masterClrMapping/>
   </p:clrMapOvr>
+  <p:timing>
+    <p:tnLst>
+      <p:par>
+        <p:cTn id="1" dur="indefinite" restart="never" nodeType="tmRoot"/>
+      </p:par>
+    </p:tnLst>
+  </p:timing>
 </p:sld>
 </file>
 
@@ -14344,7 +12347,7 @@
           <a:p>
             <a:r>
               <a:rPr lang="ru-RU" dirty="0" smtClean="0"/>
-              <a:t>Результаты исследований</a:t>
+              <a:t>Ограничения реализации</a:t>
             </a:r>
             <a:endParaRPr lang="ru-RU" dirty="0"/>
           </a:p>
@@ -14367,8 +12370,40 @@
           <a:p>
             <a:r>
               <a:rPr lang="ru-RU" dirty="0" smtClean="0"/>
-              <a:t>Надо каким-то образом показать вклад каждого из этапов на итоговый результат…</a:t>
-            </a:r>
+              <a:t>Использование мьютексов для организации критических </a:t>
+            </a:r>
+            <a:r>
+              <a:rPr lang="ru-RU" dirty="0" smtClean="0"/>
+              <a:t>секций</a:t>
+            </a:r>
+          </a:p>
+          <a:p>
+            <a:r>
+              <a:rPr lang="ru-RU" dirty="0" smtClean="0"/>
+              <a:t>Использование </a:t>
+            </a:r>
+            <a:r>
+              <a:rPr lang="en-US" dirty="0" smtClean="0"/>
+              <a:t>POSIX API</a:t>
+            </a:r>
+            <a:r>
+              <a:rPr lang="ru-RU" dirty="0" smtClean="0"/>
+              <a:t> для работы с потоками и объектами взаимоисключения</a:t>
+            </a:r>
+          </a:p>
+          <a:p>
+            <a:r>
+              <a:rPr lang="ru-RU" dirty="0" smtClean="0"/>
+              <a:t>Отсутствие обращений к полям структур</a:t>
+            </a:r>
+          </a:p>
+          <a:p>
+            <a:endParaRPr lang="ru-RU" dirty="0" smtClean="0"/>
+          </a:p>
+          <a:p>
+            <a:endParaRPr lang="ru-RU" dirty="0" smtClean="0"/>
+          </a:p>
+          <a:p>
             <a:endParaRPr lang="ru-RU" dirty="0"/>
           </a:p>
         </p:txBody>
@@ -14402,6 +12437,110 @@
   <p:clrMapOvr>
     <a:masterClrMapping/>
   </p:clrMapOvr>
+</p:sld>
+</file>
+
+<file path=ppt/slides/slide21.xml><?xml version="1.0" encoding="utf-8"?>
+<p:sld xmlns:a="http://schemas.openxmlformats.org/drawingml/2006/main" xmlns:r="http://schemas.openxmlformats.org/officeDocument/2006/relationships" xmlns:p="http://schemas.openxmlformats.org/presentationml/2006/main">
+  <p:cSld>
+    <p:spTree>
+      <p:nvGrpSpPr>
+        <p:cNvPr id="1" name=""/>
+        <p:cNvGrpSpPr/>
+        <p:nvPr/>
+      </p:nvGrpSpPr>
+      <p:grpSpPr>
+        <a:xfrm>
+          <a:off x="0" y="0"/>
+          <a:ext cx="0" cy="0"/>
+          <a:chOff x="0" y="0"/>
+          <a:chExt cx="0" cy="0"/>
+        </a:xfrm>
+      </p:grpSpPr>
+      <p:sp>
+        <p:nvSpPr>
+          <p:cNvPr id="2" name="Заголовок 1"/>
+          <p:cNvSpPr>
+            <a:spLocks noGrp="1"/>
+          </p:cNvSpPr>
+          <p:nvPr>
+            <p:ph type="title"/>
+          </p:nvPr>
+        </p:nvSpPr>
+        <p:spPr/>
+        <p:txBody>
+          <a:bodyPr/>
+          <a:lstStyle/>
+          <a:p>
+            <a:r>
+              <a:rPr lang="ru-RU" dirty="0" smtClean="0"/>
+              <a:t>Результаты исследований</a:t>
+            </a:r>
+            <a:endParaRPr lang="ru-RU" dirty="0"/>
+          </a:p>
+        </p:txBody>
+      </p:sp>
+      <p:sp>
+        <p:nvSpPr>
+          <p:cNvPr id="3" name="Содержимое 2"/>
+          <p:cNvSpPr>
+            <a:spLocks noGrp="1"/>
+          </p:cNvSpPr>
+          <p:nvPr>
+            <p:ph idx="1"/>
+          </p:nvPr>
+        </p:nvSpPr>
+        <p:spPr/>
+        <p:txBody>
+          <a:bodyPr/>
+          <a:lstStyle/>
+          <a:p>
+            <a:r>
+              <a:rPr lang="ru-RU" dirty="0" smtClean="0"/>
+              <a:t>Надо каким-то образом показать вклад каждого из этапов на итоговый результат…</a:t>
+            </a:r>
+          </a:p>
+          <a:p>
+            <a:endParaRPr lang="ru-RU" dirty="0"/>
+          </a:p>
+        </p:txBody>
+      </p:sp>
+      <p:sp>
+        <p:nvSpPr>
+          <p:cNvPr id="4" name="Номер слайда 3"/>
+          <p:cNvSpPr>
+            <a:spLocks noGrp="1"/>
+          </p:cNvSpPr>
+          <p:nvPr>
+            <p:ph type="sldNum" sz="quarter" idx="12"/>
+          </p:nvPr>
+        </p:nvSpPr>
+        <p:spPr/>
+        <p:txBody>
+          <a:bodyPr/>
+          <a:lstStyle/>
+          <a:p>
+            <a:fld id="{6ACCCD26-A6AD-4D04-8A48-0C02F87992A0}" type="slidenum">
+              <a:rPr lang="ru-RU" smtClean="0"/>
+              <a:pPr/>
+              <a:t>21</a:t>
+            </a:fld>
+            <a:endParaRPr lang="ru-RU"/>
+          </a:p>
+        </p:txBody>
+      </p:sp>
+    </p:spTree>
+  </p:cSld>
+  <p:clrMapOvr>
+    <a:masterClrMapping/>
+  </p:clrMapOvr>
+  <p:timing>
+    <p:tnLst>
+      <p:par>
+        <p:cTn id="1" dur="indefinite" restart="never" nodeType="tmRoot"/>
+      </p:par>
+    </p:tnLst>
+  </p:timing>
 </p:sld>
 </file>
 
@@ -15242,8 +13381,8 @@
         </p:blipFill>
         <p:spPr>
           <a:xfrm>
-            <a:off x="467544" y="1844824"/>
-            <a:ext cx="8229600" cy="3460531"/>
+            <a:off x="477162" y="1844824"/>
+            <a:ext cx="8210363" cy="3460531"/>
           </a:xfrm>
         </p:spPr>
       </p:pic>
@@ -15295,71 +13434,36 @@
           <a:lstStyle/>
           <a:p>
             <a:r>
-              <a:rPr lang="ru-RU" smtClean="0"/>
-              <a:t>Ограничения метода</a:t>
+              <a:rPr lang="ru-RU" dirty="0" smtClean="0"/>
+              <a:t>Метод статического поиска гонок</a:t>
             </a:r>
             <a:endParaRPr lang="ru-RU" dirty="0"/>
           </a:p>
         </p:txBody>
       </p:sp>
-      <p:sp>
-        <p:nvSpPr>
-          <p:cNvPr id="3" name="Содержимое 2"/>
-          <p:cNvSpPr>
-            <a:spLocks noGrp="1"/>
-          </p:cNvSpPr>
+      <p:pic>
+        <p:nvPicPr>
+          <p:cNvPr id="5" name="Содержимое 4" descr="idef0-black-box.emf"/>
+          <p:cNvPicPr>
+            <a:picLocks noGrp="1" noChangeAspect="1"/>
+          </p:cNvPicPr>
           <p:nvPr>
             <p:ph idx="1"/>
           </p:nvPr>
-        </p:nvSpPr>
-        <p:spPr/>
-        <p:txBody>
-          <a:bodyPr>
-            <a:normAutofit fontScale="92500" lnSpcReduction="10000"/>
-          </a:bodyPr>
-          <a:lstStyle/>
-          <a:p>
-            <a:r>
-              <a:rPr lang="ru-RU" dirty="0" smtClean="0"/>
-              <a:t>Использование </a:t>
-            </a:r>
-            <a:r>
-              <a:rPr lang="en-US" dirty="0" smtClean="0"/>
-              <a:t>POSIX API</a:t>
-            </a:r>
-          </a:p>
-          <a:p>
-            <a:r>
-              <a:rPr lang="ru-RU" dirty="0" smtClean="0"/>
-              <a:t>Отсутствие рекурсивных вызовов функций</a:t>
-            </a:r>
-          </a:p>
-          <a:p>
-            <a:r>
-              <a:rPr lang="ru-RU" dirty="0" smtClean="0"/>
-              <a:t>Использование мьютексов для организации критических секций</a:t>
-            </a:r>
-          </a:p>
-          <a:p>
-            <a:r>
-              <a:rPr lang="ru-RU" dirty="0" smtClean="0"/>
-              <a:t>Отсутствие указателей на функции</a:t>
-            </a:r>
-          </a:p>
-          <a:p>
-            <a:r>
-              <a:rPr lang="ru-RU" dirty="0" smtClean="0"/>
-              <a:t>Отсутствие обращений к памяти по заранее заданным адресам</a:t>
-            </a:r>
-          </a:p>
-          <a:p>
-            <a:r>
-              <a:rPr lang="ru-RU" dirty="0" smtClean="0"/>
-              <a:t>Уникальность имён переменных в пределах функции</a:t>
-            </a:r>
-          </a:p>
-        </p:txBody>
-      </p:sp>
+        </p:nvPicPr>
+        <p:blipFill>
+          <a:blip r:embed="rId2" cstate="print"/>
+          <a:stretch>
+            <a:fillRect/>
+          </a:stretch>
+        </p:blipFill>
+        <p:spPr>
+          <a:xfrm>
+            <a:off x="457200" y="1806084"/>
+            <a:ext cx="8229600" cy="4114194"/>
+          </a:xfrm>
+        </p:spPr>
+      </p:pic>
       <p:sp>
         <p:nvSpPr>
           <p:cNvPr id="4" name="Номер слайда 3"/>
@@ -15433,15 +13537,43 @@
           <a:p>
             <a:r>
               <a:rPr lang="ru-RU" dirty="0" smtClean="0"/>
-              <a:t>Разработанный метод</a:t>
+              <a:t>Метод статического поиска </a:t>
+            </a:r>
+            <a:r>
+              <a:rPr lang="ru-RU" dirty="0" smtClean="0"/>
+              <a:t>гонок</a:t>
             </a:r>
             <a:endParaRPr lang="ru-RU" dirty="0"/>
+          </a:p>
+        </p:txBody>
+      </p:sp>
+      <p:sp>
+        <p:nvSpPr>
+          <p:cNvPr id="4" name="Номер слайда 3"/>
+          <p:cNvSpPr>
+            <a:spLocks noGrp="1"/>
+          </p:cNvSpPr>
+          <p:nvPr>
+            <p:ph type="sldNum" sz="quarter" idx="12"/>
+          </p:nvPr>
+        </p:nvSpPr>
+        <p:spPr/>
+        <p:txBody>
+          <a:bodyPr/>
+          <a:lstStyle/>
+          <a:p>
+            <a:fld id="{6ACCCD26-A6AD-4D04-8A48-0C02F87992A0}" type="slidenum">
+              <a:rPr lang="ru-RU" smtClean="0"/>
+              <a:pPr/>
+              <a:t>6</a:t>
+            </a:fld>
+            <a:endParaRPr lang="ru-RU"/>
           </a:p>
         </p:txBody>
       </p:sp>
       <p:pic>
         <p:nvPicPr>
-          <p:cNvPr id="5" name="Содержимое 4" descr="idef0-black-box.emf"/>
+          <p:cNvPr id="9" name="Содержимое 8" descr="idef0.emf"/>
           <p:cNvPicPr>
             <a:picLocks noGrp="1" noChangeAspect="1"/>
           </p:cNvPicPr>
@@ -15457,40 +13589,23 @@
         </p:blipFill>
         <p:spPr>
           <a:xfrm>
-            <a:off x="457200" y="1806084"/>
-            <a:ext cx="8229600" cy="4114194"/>
+            <a:off x="96995" y="1628800"/>
+            <a:ext cx="8941465" cy="4464496"/>
           </a:xfrm>
         </p:spPr>
       </p:pic>
-      <p:sp>
-        <p:nvSpPr>
-          <p:cNvPr id="4" name="Номер слайда 3"/>
-          <p:cNvSpPr>
-            <a:spLocks noGrp="1"/>
-          </p:cNvSpPr>
-          <p:nvPr>
-            <p:ph type="sldNum" sz="quarter" idx="12"/>
-          </p:nvPr>
-        </p:nvSpPr>
-        <p:spPr/>
-        <p:txBody>
-          <a:bodyPr/>
-          <a:lstStyle/>
-          <a:p>
-            <a:fld id="{6ACCCD26-A6AD-4D04-8A48-0C02F87992A0}" type="slidenum">
-              <a:rPr lang="ru-RU" smtClean="0"/>
-              <a:pPr/>
-              <a:t>6</a:t>
-            </a:fld>
-            <a:endParaRPr lang="ru-RU"/>
-          </a:p>
-        </p:txBody>
-      </p:sp>
     </p:spTree>
   </p:cSld>
   <p:clrMapOvr>
     <a:masterClrMapping/>
   </p:clrMapOvr>
+  <p:timing>
+    <p:tnLst>
+      <p:par>
+        <p:cTn id="1" dur="indefinite" restart="never" nodeType="tmRoot"/>
+      </p:par>
+    </p:tnLst>
+  </p:timing>
 </p:sld>
 </file>
 
@@ -15527,10 +13642,60 @@
           <a:lstStyle/>
           <a:p>
             <a:r>
+              <a:rPr lang="ru-RU" smtClean="0"/>
+              <a:t>Ограничения метода</a:t>
+            </a:r>
+            <a:endParaRPr lang="ru-RU" dirty="0"/>
+          </a:p>
+        </p:txBody>
+      </p:sp>
+      <p:sp>
+        <p:nvSpPr>
+          <p:cNvPr id="3" name="Содержимое 2"/>
+          <p:cNvSpPr>
+            <a:spLocks noGrp="1"/>
+          </p:cNvSpPr>
+          <p:nvPr>
+            <p:ph idx="1"/>
+          </p:nvPr>
+        </p:nvSpPr>
+        <p:spPr/>
+        <p:txBody>
+          <a:bodyPr>
+            <a:normAutofit/>
+          </a:bodyPr>
+          <a:lstStyle/>
+          <a:p>
+            <a:r>
               <a:rPr lang="ru-RU" dirty="0" smtClean="0"/>
-              <a:t>Разработанный метод</a:t>
-            </a:r>
-            <a:endParaRPr lang="ru-RU" dirty="0"/>
+              <a:t>Отсутствие </a:t>
+            </a:r>
+            <a:r>
+              <a:rPr lang="ru-RU" dirty="0" smtClean="0"/>
+              <a:t>рекурсивных вызовов функций</a:t>
+            </a:r>
+          </a:p>
+          <a:p>
+            <a:r>
+              <a:rPr lang="ru-RU" dirty="0" smtClean="0"/>
+              <a:t>Отсутствие </a:t>
+            </a:r>
+            <a:r>
+              <a:rPr lang="ru-RU" dirty="0" smtClean="0"/>
+              <a:t>указателей на функции</a:t>
+            </a:r>
+          </a:p>
+          <a:p>
+            <a:r>
+              <a:rPr lang="ru-RU" dirty="0" smtClean="0"/>
+              <a:t>Отсутствие обращений к памяти по заранее заданным адресам</a:t>
+            </a:r>
+          </a:p>
+          <a:p>
+            <a:r>
+              <a:rPr lang="ru-RU" dirty="0" smtClean="0"/>
+              <a:t>Уникальность имён переменных в пределах функции</a:t>
+            </a:r>
           </a:p>
         </p:txBody>
       </p:sp>
@@ -15558,29 +13723,6 @@
           </a:p>
         </p:txBody>
       </p:sp>
-      <p:pic>
-        <p:nvPicPr>
-          <p:cNvPr id="9" name="Содержимое 8" descr="idef0.emf"/>
-          <p:cNvPicPr>
-            <a:picLocks noGrp="1" noChangeAspect="1"/>
-          </p:cNvPicPr>
-          <p:nvPr>
-            <p:ph idx="1"/>
-          </p:nvPr>
-        </p:nvPicPr>
-        <p:blipFill>
-          <a:blip r:embed="rId2" cstate="print"/>
-          <a:stretch>
-            <a:fillRect/>
-          </a:stretch>
-        </p:blipFill>
-        <p:spPr>
-          <a:xfrm>
-            <a:off x="96995" y="1628800"/>
-            <a:ext cx="8941465" cy="4464496"/>
-          </a:xfrm>
-        </p:spPr>
-      </p:pic>
     </p:spTree>
   </p:cSld>
   <p:clrMapOvr>

</xml_diff>